<commit_message>
Anpassung Methode & Ergebnisse
</commit_message>
<xml_diff>
--- a/img/CH_Beispiele.pptx
+++ b/img/CH_Beispiele.pptx
@@ -2,15 +2,21 @@
 <file path=ppt/presentation.xml><?xml version="1.0" encoding="utf-8"?>
 <p:presentation xmlns:a="http://schemas.openxmlformats.org/drawingml/2006/main" xmlns:r="http://schemas.openxmlformats.org/officeDocument/2006/relationships" xmlns:p="http://schemas.openxmlformats.org/presentationml/2006/main" saveSubsetFonts="1" autoCompressPictures="0">
   <p:sldMasterIdLst>
-    <p:sldMasterId id="2147483684" r:id="rId1"/>
+    <p:sldMasterId id="2147483708" r:id="rId1"/>
   </p:sldMasterIdLst>
   <p:notesMasterIdLst>
-    <p:notesMasterId r:id="rId3"/>
+    <p:notesMasterId r:id="rId9"/>
   </p:notesMasterIdLst>
   <p:sldIdLst>
     <p:sldId id="256" r:id="rId2"/>
+    <p:sldId id="258" r:id="rId3"/>
+    <p:sldId id="257" r:id="rId4"/>
+    <p:sldId id="259" r:id="rId5"/>
+    <p:sldId id="260" r:id="rId6"/>
+    <p:sldId id="261" r:id="rId7"/>
+    <p:sldId id="262" r:id="rId8"/>
   </p:sldIdLst>
-  <p:sldSz cx="18000663" cy="12599988"/>
+  <p:sldSz cx="7199313" cy="3600450"/>
   <p:notesSz cx="6858000" cy="9144000"/>
   <p:defaultTextStyle>
     <a:defPPr>
@@ -197,7 +203,7 @@
           <a:p>
             <a:fld id="{91C607F6-0D6D-4241-87B1-E8216A31A969}" type="datetimeFigureOut">
               <a:rPr lang="de-DE" smtClean="0"/>
-              <a:t>11.07.24</a:t>
+              <a:t>13.07.24</a:t>
             </a:fld>
             <a:endParaRPr lang="de-DE"/>
           </a:p>
@@ -215,8 +221,8 @@
         </p:nvSpPr>
         <p:spPr>
           <a:xfrm>
-            <a:off x="1223963" y="1143000"/>
-            <a:ext cx="4410075" cy="3086100"/>
+            <a:off x="344488" y="1143000"/>
+            <a:ext cx="6169025" cy="3086100"/>
           </a:xfrm>
           <a:prstGeom prst="rect">
             <a:avLst/>
@@ -370,8 +376,8 @@
   </p:cSld>
   <p:clrMap bg1="lt1" tx1="dk1" bg2="lt2" tx2="dk2" accent1="accent1" accent2="accent2" accent3="accent3" accent4="accent4" accent5="accent5" accent6="accent6" hlink="hlink" folHlink="folHlink"/>
   <p:notesStyle>
-    <a:lvl1pPr marL="0" algn="l" defTabSz="1468733" rtl="0" eaLnBrk="1" latinLnBrk="0" hangingPunct="1">
-      <a:defRPr sz="1928" kern="1200">
+    <a:lvl1pPr marL="0" algn="l" defTabSz="431954" rtl="0" eaLnBrk="1" latinLnBrk="0" hangingPunct="1">
+      <a:defRPr sz="567" kern="1200">
         <a:solidFill>
           <a:schemeClr val="tx1"/>
         </a:solidFill>
@@ -380,8 +386,8 @@
         <a:cs typeface="+mn-cs"/>
       </a:defRPr>
     </a:lvl1pPr>
-    <a:lvl2pPr marL="734367" algn="l" defTabSz="1468733" rtl="0" eaLnBrk="1" latinLnBrk="0" hangingPunct="1">
-      <a:defRPr sz="1928" kern="1200">
+    <a:lvl2pPr marL="215977" algn="l" defTabSz="431954" rtl="0" eaLnBrk="1" latinLnBrk="0" hangingPunct="1">
+      <a:defRPr sz="567" kern="1200">
         <a:solidFill>
           <a:schemeClr val="tx1"/>
         </a:solidFill>
@@ -390,8 +396,8 @@
         <a:cs typeface="+mn-cs"/>
       </a:defRPr>
     </a:lvl2pPr>
-    <a:lvl3pPr marL="1468733" algn="l" defTabSz="1468733" rtl="0" eaLnBrk="1" latinLnBrk="0" hangingPunct="1">
-      <a:defRPr sz="1928" kern="1200">
+    <a:lvl3pPr marL="431954" algn="l" defTabSz="431954" rtl="0" eaLnBrk="1" latinLnBrk="0" hangingPunct="1">
+      <a:defRPr sz="567" kern="1200">
         <a:solidFill>
           <a:schemeClr val="tx1"/>
         </a:solidFill>
@@ -400,8 +406,8 @@
         <a:cs typeface="+mn-cs"/>
       </a:defRPr>
     </a:lvl3pPr>
-    <a:lvl4pPr marL="2203100" algn="l" defTabSz="1468733" rtl="0" eaLnBrk="1" latinLnBrk="0" hangingPunct="1">
-      <a:defRPr sz="1928" kern="1200">
+    <a:lvl4pPr marL="647932" algn="l" defTabSz="431954" rtl="0" eaLnBrk="1" latinLnBrk="0" hangingPunct="1">
+      <a:defRPr sz="567" kern="1200">
         <a:solidFill>
           <a:schemeClr val="tx1"/>
         </a:solidFill>
@@ -410,8 +416,8 @@
         <a:cs typeface="+mn-cs"/>
       </a:defRPr>
     </a:lvl4pPr>
-    <a:lvl5pPr marL="2937466" algn="l" defTabSz="1468733" rtl="0" eaLnBrk="1" latinLnBrk="0" hangingPunct="1">
-      <a:defRPr sz="1928" kern="1200">
+    <a:lvl5pPr marL="863909" algn="l" defTabSz="431954" rtl="0" eaLnBrk="1" latinLnBrk="0" hangingPunct="1">
+      <a:defRPr sz="567" kern="1200">
         <a:solidFill>
           <a:schemeClr val="tx1"/>
         </a:solidFill>
@@ -420,8 +426,8 @@
         <a:cs typeface="+mn-cs"/>
       </a:defRPr>
     </a:lvl5pPr>
-    <a:lvl6pPr marL="3671833" algn="l" defTabSz="1468733" rtl="0" eaLnBrk="1" latinLnBrk="0" hangingPunct="1">
-      <a:defRPr sz="1928" kern="1200">
+    <a:lvl6pPr marL="1079886" algn="l" defTabSz="431954" rtl="0" eaLnBrk="1" latinLnBrk="0" hangingPunct="1">
+      <a:defRPr sz="567" kern="1200">
         <a:solidFill>
           <a:schemeClr val="tx1"/>
         </a:solidFill>
@@ -430,8 +436,8 @@
         <a:cs typeface="+mn-cs"/>
       </a:defRPr>
     </a:lvl6pPr>
-    <a:lvl7pPr marL="4406199" algn="l" defTabSz="1468733" rtl="0" eaLnBrk="1" latinLnBrk="0" hangingPunct="1">
-      <a:defRPr sz="1928" kern="1200">
+    <a:lvl7pPr marL="1295863" algn="l" defTabSz="431954" rtl="0" eaLnBrk="1" latinLnBrk="0" hangingPunct="1">
+      <a:defRPr sz="567" kern="1200">
         <a:solidFill>
           <a:schemeClr val="tx1"/>
         </a:solidFill>
@@ -440,8 +446,8 @@
         <a:cs typeface="+mn-cs"/>
       </a:defRPr>
     </a:lvl7pPr>
-    <a:lvl8pPr marL="5140566" algn="l" defTabSz="1468733" rtl="0" eaLnBrk="1" latinLnBrk="0" hangingPunct="1">
-      <a:defRPr sz="1928" kern="1200">
+    <a:lvl8pPr marL="1511840" algn="l" defTabSz="431954" rtl="0" eaLnBrk="1" latinLnBrk="0" hangingPunct="1">
+      <a:defRPr sz="567" kern="1200">
         <a:solidFill>
           <a:schemeClr val="tx1"/>
         </a:solidFill>
@@ -450,8 +456,8 @@
         <a:cs typeface="+mn-cs"/>
       </a:defRPr>
     </a:lvl8pPr>
-    <a:lvl9pPr marL="5874932" algn="l" defTabSz="1468733" rtl="0" eaLnBrk="1" latinLnBrk="0" hangingPunct="1">
-      <a:defRPr sz="1928" kern="1200">
+    <a:lvl9pPr marL="1727818" algn="l" defTabSz="431954" rtl="0" eaLnBrk="1" latinLnBrk="0" hangingPunct="1">
+      <a:defRPr sz="567" kern="1200">
         <a:solidFill>
           <a:schemeClr val="tx1"/>
         </a:solidFill>
@@ -493,8 +499,8 @@
         </p:nvSpPr>
         <p:spPr>
           <a:xfrm>
-            <a:off x="1223963" y="1143000"/>
-            <a:ext cx="4410075" cy="3086100"/>
+            <a:off x="344488" y="1143000"/>
+            <a:ext cx="6169025" cy="3086100"/>
           </a:xfrm>
         </p:spPr>
       </p:sp>
@@ -582,15 +588,15 @@
         </p:nvSpPr>
         <p:spPr>
           <a:xfrm>
-            <a:off x="1350050" y="2062083"/>
-            <a:ext cx="15300564" cy="4386662"/>
+            <a:off x="899914" y="589241"/>
+            <a:ext cx="5399485" cy="1253490"/>
           </a:xfrm>
         </p:spPr>
         <p:txBody>
           <a:bodyPr anchor="b"/>
           <a:lstStyle>
             <a:lvl1pPr algn="ctr">
-              <a:defRPr sz="11024"/>
+              <a:defRPr sz="3150"/>
             </a:lvl1pPr>
           </a:lstStyle>
           <a:p>
@@ -614,8 +620,8 @@
         </p:nvSpPr>
         <p:spPr>
           <a:xfrm>
-            <a:off x="2250083" y="6617911"/>
-            <a:ext cx="13500497" cy="3042080"/>
+            <a:off x="899914" y="1891070"/>
+            <a:ext cx="5399485" cy="869275"/>
           </a:xfrm>
         </p:spPr>
         <p:txBody>
@@ -623,39 +629,39 @@
           <a:lstStyle>
             <a:lvl1pPr marL="0" indent="0" algn="ctr">
               <a:buNone/>
-              <a:defRPr sz="4410"/>
+              <a:defRPr sz="1260"/>
             </a:lvl1pPr>
-            <a:lvl2pPr marL="840014" indent="0" algn="ctr">
+            <a:lvl2pPr marL="240030" indent="0" algn="ctr">
               <a:buNone/>
-              <a:defRPr sz="3675"/>
+              <a:defRPr sz="1050"/>
             </a:lvl2pPr>
-            <a:lvl3pPr marL="1680027" indent="0" algn="ctr">
+            <a:lvl3pPr marL="480060" indent="0" algn="ctr">
               <a:buNone/>
-              <a:defRPr sz="3307"/>
+              <a:defRPr sz="945"/>
             </a:lvl3pPr>
-            <a:lvl4pPr marL="2520041" indent="0" algn="ctr">
+            <a:lvl4pPr marL="720090" indent="0" algn="ctr">
               <a:buNone/>
-              <a:defRPr sz="2940"/>
+              <a:defRPr sz="840"/>
             </a:lvl4pPr>
-            <a:lvl5pPr marL="3360054" indent="0" algn="ctr">
+            <a:lvl5pPr marL="960120" indent="0" algn="ctr">
               <a:buNone/>
-              <a:defRPr sz="2940"/>
+              <a:defRPr sz="840"/>
             </a:lvl5pPr>
-            <a:lvl6pPr marL="4200068" indent="0" algn="ctr">
+            <a:lvl6pPr marL="1200150" indent="0" algn="ctr">
               <a:buNone/>
-              <a:defRPr sz="2940"/>
+              <a:defRPr sz="840"/>
             </a:lvl6pPr>
-            <a:lvl7pPr marL="5040081" indent="0" algn="ctr">
+            <a:lvl7pPr marL="1440180" indent="0" algn="ctr">
               <a:buNone/>
-              <a:defRPr sz="2940"/>
+              <a:defRPr sz="840"/>
             </a:lvl7pPr>
-            <a:lvl8pPr marL="5880095" indent="0" algn="ctr">
+            <a:lvl8pPr marL="1680210" indent="0" algn="ctr">
               <a:buNone/>
-              <a:defRPr sz="2940"/>
+              <a:defRPr sz="840"/>
             </a:lvl8pPr>
-            <a:lvl9pPr marL="6720108" indent="0" algn="ctr">
+            <a:lvl9pPr marL="1920240" indent="0" algn="ctr">
               <a:buNone/>
-              <a:defRPr sz="2940"/>
+              <a:defRPr sz="840"/>
             </a:lvl9pPr>
           </a:lstStyle>
           <a:p>
@@ -684,7 +690,7 @@
           <a:p>
             <a:fld id="{C85938DC-A15A-4447-9D72-A08E970E92F8}" type="datetimeFigureOut">
               <a:rPr lang="de-DE" smtClean="0"/>
-              <a:t>11.07.24</a:t>
+              <a:t>13.07.24</a:t>
             </a:fld>
             <a:endParaRPr lang="de-DE"/>
           </a:p>
@@ -735,7 +741,7 @@
     </p:spTree>
     <p:extLst>
       <p:ext uri="{BB962C8B-B14F-4D97-AF65-F5344CB8AC3E}">
-        <p14:creationId xmlns:p14="http://schemas.microsoft.com/office/powerpoint/2010/main" val="1647427733"/>
+        <p14:creationId xmlns:p14="http://schemas.microsoft.com/office/powerpoint/2010/main" val="1174836108"/>
       </p:ext>
     </p:extLst>
   </p:cSld>
@@ -854,7 +860,7 @@
           <a:p>
             <a:fld id="{C85938DC-A15A-4447-9D72-A08E970E92F8}" type="datetimeFigureOut">
               <a:rPr lang="de-DE" smtClean="0"/>
-              <a:t>11.07.24</a:t>
+              <a:t>13.07.24</a:t>
             </a:fld>
             <a:endParaRPr lang="de-DE"/>
           </a:p>
@@ -905,7 +911,7 @@
     </p:spTree>
     <p:extLst>
       <p:ext uri="{BB962C8B-B14F-4D97-AF65-F5344CB8AC3E}">
-        <p14:creationId xmlns:p14="http://schemas.microsoft.com/office/powerpoint/2010/main" val="4142086358"/>
+        <p14:creationId xmlns:p14="http://schemas.microsoft.com/office/powerpoint/2010/main" val="3885929336"/>
       </p:ext>
     </p:extLst>
   </p:cSld>
@@ -944,8 +950,8 @@
         </p:nvSpPr>
         <p:spPr>
           <a:xfrm>
-            <a:off x="12881725" y="670833"/>
-            <a:ext cx="3881393" cy="10677907"/>
+            <a:off x="5152008" y="191691"/>
+            <a:ext cx="1552352" cy="3051215"/>
           </a:xfrm>
         </p:spPr>
         <p:txBody>
@@ -972,8 +978,8 @@
         </p:nvSpPr>
         <p:spPr>
           <a:xfrm>
-            <a:off x="1237546" y="670833"/>
-            <a:ext cx="11419171" cy="10677907"/>
+            <a:off x="494953" y="191691"/>
+            <a:ext cx="4567064" cy="3051215"/>
           </a:xfrm>
         </p:spPr>
         <p:txBody>
@@ -1034,7 +1040,7 @@
           <a:p>
             <a:fld id="{C85938DC-A15A-4447-9D72-A08E970E92F8}" type="datetimeFigureOut">
               <a:rPr lang="de-DE" smtClean="0"/>
-              <a:t>11.07.24</a:t>
+              <a:t>13.07.24</a:t>
             </a:fld>
             <a:endParaRPr lang="de-DE"/>
           </a:p>
@@ -1085,7 +1091,7 @@
     </p:spTree>
     <p:extLst>
       <p:ext uri="{BB962C8B-B14F-4D97-AF65-F5344CB8AC3E}">
-        <p14:creationId xmlns:p14="http://schemas.microsoft.com/office/powerpoint/2010/main" val="3880238506"/>
+        <p14:creationId xmlns:p14="http://schemas.microsoft.com/office/powerpoint/2010/main" val="2133969537"/>
       </p:ext>
     </p:extLst>
   </p:cSld>
@@ -1204,7 +1210,7 @@
           <a:p>
             <a:fld id="{C85938DC-A15A-4447-9D72-A08E970E92F8}" type="datetimeFigureOut">
               <a:rPr lang="de-DE" smtClean="0"/>
-              <a:t>11.07.24</a:t>
+              <a:t>13.07.24</a:t>
             </a:fld>
             <a:endParaRPr lang="de-DE"/>
           </a:p>
@@ -1255,7 +1261,7 @@
     </p:spTree>
     <p:extLst>
       <p:ext uri="{BB962C8B-B14F-4D97-AF65-F5344CB8AC3E}">
-        <p14:creationId xmlns:p14="http://schemas.microsoft.com/office/powerpoint/2010/main" val="658264708"/>
+        <p14:creationId xmlns:p14="http://schemas.microsoft.com/office/powerpoint/2010/main" val="1879457455"/>
       </p:ext>
     </p:extLst>
   </p:cSld>
@@ -1294,15 +1300,15 @@
         </p:nvSpPr>
         <p:spPr>
           <a:xfrm>
-            <a:off x="1228171" y="3141251"/>
-            <a:ext cx="15525572" cy="5241244"/>
+            <a:off x="491203" y="897613"/>
+            <a:ext cx="6209407" cy="1497687"/>
           </a:xfrm>
         </p:spPr>
         <p:txBody>
           <a:bodyPr anchor="b"/>
           <a:lstStyle>
             <a:lvl1pPr>
-              <a:defRPr sz="11024"/>
+              <a:defRPr sz="3150"/>
             </a:lvl1pPr>
           </a:lstStyle>
           <a:p>
@@ -1326,8 +1332,8 @@
         </p:nvSpPr>
         <p:spPr>
           <a:xfrm>
-            <a:off x="1228171" y="8432079"/>
-            <a:ext cx="15525572" cy="2756246"/>
+            <a:off x="491203" y="2409468"/>
+            <a:ext cx="6209407" cy="787598"/>
           </a:xfrm>
         </p:spPr>
         <p:txBody>
@@ -1335,7 +1341,7 @@
           <a:lstStyle>
             <a:lvl1pPr marL="0" indent="0">
               <a:buNone/>
-              <a:defRPr sz="4410">
+              <a:defRPr sz="1260">
                 <a:solidFill>
                   <a:schemeClr val="tx1">
                     <a:shade val="82000"/>
@@ -1343,9 +1349,9 @@
                 </a:solidFill>
               </a:defRPr>
             </a:lvl1pPr>
-            <a:lvl2pPr marL="840014" indent="0">
+            <a:lvl2pPr marL="240030" indent="0">
               <a:buNone/>
-              <a:defRPr sz="3675">
+              <a:defRPr sz="1050">
                 <a:solidFill>
                   <a:schemeClr val="tx1">
                     <a:shade val="82000"/>
@@ -1353,9 +1359,9 @@
                 </a:solidFill>
               </a:defRPr>
             </a:lvl2pPr>
-            <a:lvl3pPr marL="1680027" indent="0">
+            <a:lvl3pPr marL="480060" indent="0">
               <a:buNone/>
-              <a:defRPr sz="3307">
+              <a:defRPr sz="945">
                 <a:solidFill>
                   <a:schemeClr val="tx1">
                     <a:shade val="82000"/>
@@ -1363,9 +1369,9 @@
                 </a:solidFill>
               </a:defRPr>
             </a:lvl3pPr>
-            <a:lvl4pPr marL="2520041" indent="0">
+            <a:lvl4pPr marL="720090" indent="0">
               <a:buNone/>
-              <a:defRPr sz="2940">
+              <a:defRPr sz="840">
                 <a:solidFill>
                   <a:schemeClr val="tx1">
                     <a:shade val="82000"/>
@@ -1373,9 +1379,9 @@
                 </a:solidFill>
               </a:defRPr>
             </a:lvl4pPr>
-            <a:lvl5pPr marL="3360054" indent="0">
+            <a:lvl5pPr marL="960120" indent="0">
               <a:buNone/>
-              <a:defRPr sz="2940">
+              <a:defRPr sz="840">
                 <a:solidFill>
                   <a:schemeClr val="tx1">
                     <a:shade val="82000"/>
@@ -1383,9 +1389,9 @@
                 </a:solidFill>
               </a:defRPr>
             </a:lvl5pPr>
-            <a:lvl6pPr marL="4200068" indent="0">
+            <a:lvl6pPr marL="1200150" indent="0">
               <a:buNone/>
-              <a:defRPr sz="2940">
+              <a:defRPr sz="840">
                 <a:solidFill>
                   <a:schemeClr val="tx1">
                     <a:shade val="82000"/>
@@ -1393,9 +1399,9 @@
                 </a:solidFill>
               </a:defRPr>
             </a:lvl6pPr>
-            <a:lvl7pPr marL="5040081" indent="0">
+            <a:lvl7pPr marL="1440180" indent="0">
               <a:buNone/>
-              <a:defRPr sz="2940">
+              <a:defRPr sz="840">
                 <a:solidFill>
                   <a:schemeClr val="tx1">
                     <a:shade val="82000"/>
@@ -1403,9 +1409,9 @@
                 </a:solidFill>
               </a:defRPr>
             </a:lvl7pPr>
-            <a:lvl8pPr marL="5880095" indent="0">
+            <a:lvl8pPr marL="1680210" indent="0">
               <a:buNone/>
-              <a:defRPr sz="2940">
+              <a:defRPr sz="840">
                 <a:solidFill>
                   <a:schemeClr val="tx1">
                     <a:shade val="82000"/>
@@ -1413,9 +1419,9 @@
                 </a:solidFill>
               </a:defRPr>
             </a:lvl8pPr>
-            <a:lvl9pPr marL="6720108" indent="0">
+            <a:lvl9pPr marL="1920240" indent="0">
               <a:buNone/>
-              <a:defRPr sz="2940">
+              <a:defRPr sz="840">
                 <a:solidFill>
                   <a:schemeClr val="tx1">
                     <a:shade val="82000"/>
@@ -1450,7 +1456,7 @@
           <a:p>
             <a:fld id="{C85938DC-A15A-4447-9D72-A08E970E92F8}" type="datetimeFigureOut">
               <a:rPr lang="de-DE" smtClean="0"/>
-              <a:t>11.07.24</a:t>
+              <a:t>13.07.24</a:t>
             </a:fld>
             <a:endParaRPr lang="de-DE"/>
           </a:p>
@@ -1501,7 +1507,7 @@
     </p:spTree>
     <p:extLst>
       <p:ext uri="{BB962C8B-B14F-4D97-AF65-F5344CB8AC3E}">
-        <p14:creationId xmlns:p14="http://schemas.microsoft.com/office/powerpoint/2010/main" val="661892009"/>
+        <p14:creationId xmlns:p14="http://schemas.microsoft.com/office/powerpoint/2010/main" val="3167104526"/>
       </p:ext>
     </p:extLst>
   </p:cSld>
@@ -1563,8 +1569,8 @@
         </p:nvSpPr>
         <p:spPr>
           <a:xfrm>
-            <a:off x="1237545" y="3354163"/>
-            <a:ext cx="7650282" cy="7994577"/>
+            <a:off x="494953" y="958453"/>
+            <a:ext cx="3059708" cy="2284452"/>
           </a:xfrm>
         </p:spPr>
         <p:txBody>
@@ -1620,8 +1626,8 @@
         </p:nvSpPr>
         <p:spPr>
           <a:xfrm>
-            <a:off x="9112836" y="3354163"/>
-            <a:ext cx="7650282" cy="7994577"/>
+            <a:off x="3644652" y="958453"/>
+            <a:ext cx="3059708" cy="2284452"/>
           </a:xfrm>
         </p:spPr>
         <p:txBody>
@@ -1682,7 +1688,7 @@
           <a:p>
             <a:fld id="{C85938DC-A15A-4447-9D72-A08E970E92F8}" type="datetimeFigureOut">
               <a:rPr lang="de-DE" smtClean="0"/>
-              <a:t>11.07.24</a:t>
+              <a:t>13.07.24</a:t>
             </a:fld>
             <a:endParaRPr lang="de-DE"/>
           </a:p>
@@ -1733,7 +1739,7 @@
     </p:spTree>
     <p:extLst>
       <p:ext uri="{BB962C8B-B14F-4D97-AF65-F5344CB8AC3E}">
-        <p14:creationId xmlns:p14="http://schemas.microsoft.com/office/powerpoint/2010/main" val="1647381637"/>
+        <p14:creationId xmlns:p14="http://schemas.microsoft.com/office/powerpoint/2010/main" val="2287426887"/>
       </p:ext>
     </p:extLst>
   </p:cSld>
@@ -1772,8 +1778,8 @@
         </p:nvSpPr>
         <p:spPr>
           <a:xfrm>
-            <a:off x="1239890" y="670836"/>
-            <a:ext cx="15525572" cy="2435415"/>
+            <a:off x="495891" y="191691"/>
+            <a:ext cx="6209407" cy="695921"/>
           </a:xfrm>
         </p:spPr>
         <p:txBody>
@@ -1800,8 +1806,8 @@
         </p:nvSpPr>
         <p:spPr>
           <a:xfrm>
-            <a:off x="1239892" y="3088748"/>
-            <a:ext cx="7615123" cy="1513748"/>
+            <a:off x="495891" y="882610"/>
+            <a:ext cx="3045647" cy="432554"/>
           </a:xfrm>
         </p:spPr>
         <p:txBody>
@@ -1809,39 +1815,39 @@
           <a:lstStyle>
             <a:lvl1pPr marL="0" indent="0">
               <a:buNone/>
-              <a:defRPr sz="4410" b="1"/>
+              <a:defRPr sz="1260" b="1"/>
             </a:lvl1pPr>
-            <a:lvl2pPr marL="840014" indent="0">
+            <a:lvl2pPr marL="240030" indent="0">
               <a:buNone/>
-              <a:defRPr sz="3675" b="1"/>
+              <a:defRPr sz="1050" b="1"/>
             </a:lvl2pPr>
-            <a:lvl3pPr marL="1680027" indent="0">
+            <a:lvl3pPr marL="480060" indent="0">
               <a:buNone/>
-              <a:defRPr sz="3307" b="1"/>
+              <a:defRPr sz="945" b="1"/>
             </a:lvl3pPr>
-            <a:lvl4pPr marL="2520041" indent="0">
+            <a:lvl4pPr marL="720090" indent="0">
               <a:buNone/>
-              <a:defRPr sz="2940" b="1"/>
+              <a:defRPr sz="840" b="1"/>
             </a:lvl4pPr>
-            <a:lvl5pPr marL="3360054" indent="0">
+            <a:lvl5pPr marL="960120" indent="0">
               <a:buNone/>
-              <a:defRPr sz="2940" b="1"/>
+              <a:defRPr sz="840" b="1"/>
             </a:lvl5pPr>
-            <a:lvl6pPr marL="4200068" indent="0">
+            <a:lvl6pPr marL="1200150" indent="0">
               <a:buNone/>
-              <a:defRPr sz="2940" b="1"/>
+              <a:defRPr sz="840" b="1"/>
             </a:lvl6pPr>
-            <a:lvl7pPr marL="5040081" indent="0">
+            <a:lvl7pPr marL="1440180" indent="0">
               <a:buNone/>
-              <a:defRPr sz="2940" b="1"/>
+              <a:defRPr sz="840" b="1"/>
             </a:lvl7pPr>
-            <a:lvl8pPr marL="5880095" indent="0">
+            <a:lvl8pPr marL="1680210" indent="0">
               <a:buNone/>
-              <a:defRPr sz="2940" b="1"/>
+              <a:defRPr sz="840" b="1"/>
             </a:lvl8pPr>
-            <a:lvl9pPr marL="6720108" indent="0">
+            <a:lvl9pPr marL="1920240" indent="0">
               <a:buNone/>
-              <a:defRPr sz="2940" b="1"/>
+              <a:defRPr sz="840" b="1"/>
             </a:lvl9pPr>
           </a:lstStyle>
           <a:p>
@@ -1865,8 +1871,8 @@
         </p:nvSpPr>
         <p:spPr>
           <a:xfrm>
-            <a:off x="1239892" y="4602496"/>
-            <a:ext cx="7615123" cy="6769578"/>
+            <a:off x="495891" y="1315164"/>
+            <a:ext cx="3045647" cy="1934409"/>
           </a:xfrm>
         </p:spPr>
         <p:txBody>
@@ -1922,8 +1928,8 @@
         </p:nvSpPr>
         <p:spPr>
           <a:xfrm>
-            <a:off x="9112837" y="3088748"/>
-            <a:ext cx="7652626" cy="1513748"/>
+            <a:off x="3644652" y="882610"/>
+            <a:ext cx="3060646" cy="432554"/>
           </a:xfrm>
         </p:spPr>
         <p:txBody>
@@ -1931,39 +1937,39 @@
           <a:lstStyle>
             <a:lvl1pPr marL="0" indent="0">
               <a:buNone/>
-              <a:defRPr sz="4410" b="1"/>
+              <a:defRPr sz="1260" b="1"/>
             </a:lvl1pPr>
-            <a:lvl2pPr marL="840014" indent="0">
+            <a:lvl2pPr marL="240030" indent="0">
               <a:buNone/>
-              <a:defRPr sz="3675" b="1"/>
+              <a:defRPr sz="1050" b="1"/>
             </a:lvl2pPr>
-            <a:lvl3pPr marL="1680027" indent="0">
+            <a:lvl3pPr marL="480060" indent="0">
               <a:buNone/>
-              <a:defRPr sz="3307" b="1"/>
+              <a:defRPr sz="945" b="1"/>
             </a:lvl3pPr>
-            <a:lvl4pPr marL="2520041" indent="0">
+            <a:lvl4pPr marL="720090" indent="0">
               <a:buNone/>
-              <a:defRPr sz="2940" b="1"/>
+              <a:defRPr sz="840" b="1"/>
             </a:lvl4pPr>
-            <a:lvl5pPr marL="3360054" indent="0">
+            <a:lvl5pPr marL="960120" indent="0">
               <a:buNone/>
-              <a:defRPr sz="2940" b="1"/>
+              <a:defRPr sz="840" b="1"/>
             </a:lvl5pPr>
-            <a:lvl6pPr marL="4200068" indent="0">
+            <a:lvl6pPr marL="1200150" indent="0">
               <a:buNone/>
-              <a:defRPr sz="2940" b="1"/>
+              <a:defRPr sz="840" b="1"/>
             </a:lvl6pPr>
-            <a:lvl7pPr marL="5040081" indent="0">
+            <a:lvl7pPr marL="1440180" indent="0">
               <a:buNone/>
-              <a:defRPr sz="2940" b="1"/>
+              <a:defRPr sz="840" b="1"/>
             </a:lvl7pPr>
-            <a:lvl8pPr marL="5880095" indent="0">
+            <a:lvl8pPr marL="1680210" indent="0">
               <a:buNone/>
-              <a:defRPr sz="2940" b="1"/>
+              <a:defRPr sz="840" b="1"/>
             </a:lvl8pPr>
-            <a:lvl9pPr marL="6720108" indent="0">
+            <a:lvl9pPr marL="1920240" indent="0">
               <a:buNone/>
-              <a:defRPr sz="2940" b="1"/>
+              <a:defRPr sz="840" b="1"/>
             </a:lvl9pPr>
           </a:lstStyle>
           <a:p>
@@ -1987,8 +1993,8 @@
         </p:nvSpPr>
         <p:spPr>
           <a:xfrm>
-            <a:off x="9112837" y="4602496"/>
-            <a:ext cx="7652626" cy="6769578"/>
+            <a:off x="3644652" y="1315164"/>
+            <a:ext cx="3060646" cy="1934409"/>
           </a:xfrm>
         </p:spPr>
         <p:txBody>
@@ -2049,7 +2055,7 @@
           <a:p>
             <a:fld id="{C85938DC-A15A-4447-9D72-A08E970E92F8}" type="datetimeFigureOut">
               <a:rPr lang="de-DE" smtClean="0"/>
-              <a:t>11.07.24</a:t>
+              <a:t>13.07.24</a:t>
             </a:fld>
             <a:endParaRPr lang="de-DE"/>
           </a:p>
@@ -2100,7 +2106,7 @@
     </p:spTree>
     <p:extLst>
       <p:ext uri="{BB962C8B-B14F-4D97-AF65-F5344CB8AC3E}">
-        <p14:creationId xmlns:p14="http://schemas.microsoft.com/office/powerpoint/2010/main" val="956354575"/>
+        <p14:creationId xmlns:p14="http://schemas.microsoft.com/office/powerpoint/2010/main" val="2710008416"/>
       </p:ext>
     </p:extLst>
   </p:cSld>
@@ -2167,7 +2173,7 @@
           <a:p>
             <a:fld id="{C85938DC-A15A-4447-9D72-A08E970E92F8}" type="datetimeFigureOut">
               <a:rPr lang="de-DE" smtClean="0"/>
-              <a:t>11.07.24</a:t>
+              <a:t>13.07.24</a:t>
             </a:fld>
             <a:endParaRPr lang="de-DE"/>
           </a:p>
@@ -2218,7 +2224,7 @@
     </p:spTree>
     <p:extLst>
       <p:ext uri="{BB962C8B-B14F-4D97-AF65-F5344CB8AC3E}">
-        <p14:creationId xmlns:p14="http://schemas.microsoft.com/office/powerpoint/2010/main" val="456607092"/>
+        <p14:creationId xmlns:p14="http://schemas.microsoft.com/office/powerpoint/2010/main" val="2078072965"/>
       </p:ext>
     </p:extLst>
   </p:cSld>
@@ -2262,7 +2268,7 @@
           <a:p>
             <a:fld id="{C85938DC-A15A-4447-9D72-A08E970E92F8}" type="datetimeFigureOut">
               <a:rPr lang="de-DE" smtClean="0"/>
-              <a:t>11.07.24</a:t>
+              <a:t>13.07.24</a:t>
             </a:fld>
             <a:endParaRPr lang="de-DE"/>
           </a:p>
@@ -2313,7 +2319,7 @@
     </p:spTree>
     <p:extLst>
       <p:ext uri="{BB962C8B-B14F-4D97-AF65-F5344CB8AC3E}">
-        <p14:creationId xmlns:p14="http://schemas.microsoft.com/office/powerpoint/2010/main" val="1105760881"/>
+        <p14:creationId xmlns:p14="http://schemas.microsoft.com/office/powerpoint/2010/main" val="2978388183"/>
       </p:ext>
     </p:extLst>
   </p:cSld>
@@ -2352,15 +2358,15 @@
         </p:nvSpPr>
         <p:spPr>
           <a:xfrm>
-            <a:off x="1239890" y="839999"/>
-            <a:ext cx="5805682" cy="2939997"/>
+            <a:off x="495891" y="240030"/>
+            <a:ext cx="2321966" cy="840105"/>
           </a:xfrm>
         </p:spPr>
         <p:txBody>
           <a:bodyPr anchor="b"/>
           <a:lstStyle>
             <a:lvl1pPr>
-              <a:defRPr sz="5879"/>
+              <a:defRPr sz="1680"/>
             </a:lvl1pPr>
           </a:lstStyle>
           <a:p>
@@ -2384,39 +2390,39 @@
         </p:nvSpPr>
         <p:spPr>
           <a:xfrm>
-            <a:off x="7652626" y="1814168"/>
-            <a:ext cx="9112836" cy="8954158"/>
+            <a:off x="3060646" y="518398"/>
+            <a:ext cx="3644652" cy="2558653"/>
           </a:xfrm>
         </p:spPr>
         <p:txBody>
           <a:bodyPr/>
           <a:lstStyle>
             <a:lvl1pPr>
-              <a:defRPr sz="5879"/>
+              <a:defRPr sz="1680"/>
             </a:lvl1pPr>
             <a:lvl2pPr>
-              <a:defRPr sz="5144"/>
+              <a:defRPr sz="1470"/>
             </a:lvl2pPr>
             <a:lvl3pPr>
-              <a:defRPr sz="4410"/>
+              <a:defRPr sz="1260"/>
             </a:lvl3pPr>
             <a:lvl4pPr>
-              <a:defRPr sz="3675"/>
+              <a:defRPr sz="1050"/>
             </a:lvl4pPr>
             <a:lvl5pPr>
-              <a:defRPr sz="3675"/>
+              <a:defRPr sz="1050"/>
             </a:lvl5pPr>
             <a:lvl6pPr>
-              <a:defRPr sz="3675"/>
+              <a:defRPr sz="1050"/>
             </a:lvl6pPr>
             <a:lvl7pPr>
-              <a:defRPr sz="3675"/>
+              <a:defRPr sz="1050"/>
             </a:lvl7pPr>
             <a:lvl8pPr>
-              <a:defRPr sz="3675"/>
+              <a:defRPr sz="1050"/>
             </a:lvl8pPr>
             <a:lvl9pPr>
-              <a:defRPr sz="3675"/>
+              <a:defRPr sz="1050"/>
             </a:lvl9pPr>
           </a:lstStyle>
           <a:p>
@@ -2469,8 +2475,8 @@
         </p:nvSpPr>
         <p:spPr>
           <a:xfrm>
-            <a:off x="1239890" y="3779996"/>
-            <a:ext cx="5805682" cy="7002911"/>
+            <a:off x="495891" y="1080135"/>
+            <a:ext cx="2321966" cy="2001084"/>
           </a:xfrm>
         </p:spPr>
         <p:txBody>
@@ -2478,39 +2484,39 @@
           <a:lstStyle>
             <a:lvl1pPr marL="0" indent="0">
               <a:buNone/>
-              <a:defRPr sz="2940"/>
+              <a:defRPr sz="840"/>
             </a:lvl1pPr>
-            <a:lvl2pPr marL="840014" indent="0">
+            <a:lvl2pPr marL="240030" indent="0">
               <a:buNone/>
-              <a:defRPr sz="2572"/>
+              <a:defRPr sz="735"/>
             </a:lvl2pPr>
-            <a:lvl3pPr marL="1680027" indent="0">
+            <a:lvl3pPr marL="480060" indent="0">
               <a:buNone/>
-              <a:defRPr sz="2205"/>
+              <a:defRPr sz="630"/>
             </a:lvl3pPr>
-            <a:lvl4pPr marL="2520041" indent="0">
+            <a:lvl4pPr marL="720090" indent="0">
               <a:buNone/>
-              <a:defRPr sz="1837"/>
+              <a:defRPr sz="525"/>
             </a:lvl4pPr>
-            <a:lvl5pPr marL="3360054" indent="0">
+            <a:lvl5pPr marL="960120" indent="0">
               <a:buNone/>
-              <a:defRPr sz="1837"/>
+              <a:defRPr sz="525"/>
             </a:lvl5pPr>
-            <a:lvl6pPr marL="4200068" indent="0">
+            <a:lvl6pPr marL="1200150" indent="0">
               <a:buNone/>
-              <a:defRPr sz="1837"/>
+              <a:defRPr sz="525"/>
             </a:lvl6pPr>
-            <a:lvl7pPr marL="5040081" indent="0">
+            <a:lvl7pPr marL="1440180" indent="0">
               <a:buNone/>
-              <a:defRPr sz="1837"/>
+              <a:defRPr sz="525"/>
             </a:lvl7pPr>
-            <a:lvl8pPr marL="5880095" indent="0">
+            <a:lvl8pPr marL="1680210" indent="0">
               <a:buNone/>
-              <a:defRPr sz="1837"/>
+              <a:defRPr sz="525"/>
             </a:lvl8pPr>
-            <a:lvl9pPr marL="6720108" indent="0">
+            <a:lvl9pPr marL="1920240" indent="0">
               <a:buNone/>
-              <a:defRPr sz="1837"/>
+              <a:defRPr sz="525"/>
             </a:lvl9pPr>
           </a:lstStyle>
           <a:p>
@@ -2539,7 +2545,7 @@
           <a:p>
             <a:fld id="{C85938DC-A15A-4447-9D72-A08E970E92F8}" type="datetimeFigureOut">
               <a:rPr lang="de-DE" smtClean="0"/>
-              <a:t>11.07.24</a:t>
+              <a:t>13.07.24</a:t>
             </a:fld>
             <a:endParaRPr lang="de-DE"/>
           </a:p>
@@ -2590,7 +2596,7 @@
     </p:spTree>
     <p:extLst>
       <p:ext uri="{BB962C8B-B14F-4D97-AF65-F5344CB8AC3E}">
-        <p14:creationId xmlns:p14="http://schemas.microsoft.com/office/powerpoint/2010/main" val="401986108"/>
+        <p14:creationId xmlns:p14="http://schemas.microsoft.com/office/powerpoint/2010/main" val="3317971868"/>
       </p:ext>
     </p:extLst>
   </p:cSld>
@@ -2629,15 +2635,15 @@
         </p:nvSpPr>
         <p:spPr>
           <a:xfrm>
-            <a:off x="1239890" y="839999"/>
-            <a:ext cx="5805682" cy="2939997"/>
+            <a:off x="495891" y="240030"/>
+            <a:ext cx="2321966" cy="840105"/>
           </a:xfrm>
         </p:spPr>
         <p:txBody>
           <a:bodyPr anchor="b"/>
           <a:lstStyle>
             <a:lvl1pPr>
-              <a:defRPr sz="5879"/>
+              <a:defRPr sz="1680"/>
             </a:lvl1pPr>
           </a:lstStyle>
           <a:p>
@@ -2661,8 +2667,8 @@
         </p:nvSpPr>
         <p:spPr>
           <a:xfrm>
-            <a:off x="7652626" y="1814168"/>
-            <a:ext cx="9112836" cy="8954158"/>
+            <a:off x="3060646" y="518398"/>
+            <a:ext cx="3644652" cy="2558653"/>
           </a:xfrm>
         </p:spPr>
         <p:txBody>
@@ -2670,39 +2676,39 @@
           <a:lstStyle>
             <a:lvl1pPr marL="0" indent="0">
               <a:buNone/>
-              <a:defRPr sz="5879"/>
+              <a:defRPr sz="1680"/>
             </a:lvl1pPr>
-            <a:lvl2pPr marL="840014" indent="0">
+            <a:lvl2pPr marL="240030" indent="0">
               <a:buNone/>
-              <a:defRPr sz="5144"/>
+              <a:defRPr sz="1470"/>
             </a:lvl2pPr>
-            <a:lvl3pPr marL="1680027" indent="0">
+            <a:lvl3pPr marL="480060" indent="0">
               <a:buNone/>
-              <a:defRPr sz="4410"/>
+              <a:defRPr sz="1260"/>
             </a:lvl3pPr>
-            <a:lvl4pPr marL="2520041" indent="0">
+            <a:lvl4pPr marL="720090" indent="0">
               <a:buNone/>
-              <a:defRPr sz="3675"/>
+              <a:defRPr sz="1050"/>
             </a:lvl4pPr>
-            <a:lvl5pPr marL="3360054" indent="0">
+            <a:lvl5pPr marL="960120" indent="0">
               <a:buNone/>
-              <a:defRPr sz="3675"/>
+              <a:defRPr sz="1050"/>
             </a:lvl5pPr>
-            <a:lvl6pPr marL="4200068" indent="0">
+            <a:lvl6pPr marL="1200150" indent="0">
               <a:buNone/>
-              <a:defRPr sz="3675"/>
+              <a:defRPr sz="1050"/>
             </a:lvl6pPr>
-            <a:lvl7pPr marL="5040081" indent="0">
+            <a:lvl7pPr marL="1440180" indent="0">
               <a:buNone/>
-              <a:defRPr sz="3675"/>
+              <a:defRPr sz="1050"/>
             </a:lvl7pPr>
-            <a:lvl8pPr marL="5880095" indent="0">
+            <a:lvl8pPr marL="1680210" indent="0">
               <a:buNone/>
-              <a:defRPr sz="3675"/>
+              <a:defRPr sz="1050"/>
             </a:lvl8pPr>
-            <a:lvl9pPr marL="6720108" indent="0">
+            <a:lvl9pPr marL="1920240" indent="0">
               <a:buNone/>
-              <a:defRPr sz="3675"/>
+              <a:defRPr sz="1050"/>
             </a:lvl9pPr>
           </a:lstStyle>
           <a:p>
@@ -2726,8 +2732,8 @@
         </p:nvSpPr>
         <p:spPr>
           <a:xfrm>
-            <a:off x="1239890" y="3779996"/>
-            <a:ext cx="5805682" cy="7002911"/>
+            <a:off x="495891" y="1080135"/>
+            <a:ext cx="2321966" cy="2001084"/>
           </a:xfrm>
         </p:spPr>
         <p:txBody>
@@ -2735,39 +2741,39 @@
           <a:lstStyle>
             <a:lvl1pPr marL="0" indent="0">
               <a:buNone/>
-              <a:defRPr sz="2940"/>
+              <a:defRPr sz="840"/>
             </a:lvl1pPr>
-            <a:lvl2pPr marL="840014" indent="0">
+            <a:lvl2pPr marL="240030" indent="0">
               <a:buNone/>
-              <a:defRPr sz="2572"/>
+              <a:defRPr sz="735"/>
             </a:lvl2pPr>
-            <a:lvl3pPr marL="1680027" indent="0">
+            <a:lvl3pPr marL="480060" indent="0">
               <a:buNone/>
-              <a:defRPr sz="2205"/>
+              <a:defRPr sz="630"/>
             </a:lvl3pPr>
-            <a:lvl4pPr marL="2520041" indent="0">
+            <a:lvl4pPr marL="720090" indent="0">
               <a:buNone/>
-              <a:defRPr sz="1837"/>
+              <a:defRPr sz="525"/>
             </a:lvl4pPr>
-            <a:lvl5pPr marL="3360054" indent="0">
+            <a:lvl5pPr marL="960120" indent="0">
               <a:buNone/>
-              <a:defRPr sz="1837"/>
+              <a:defRPr sz="525"/>
             </a:lvl5pPr>
-            <a:lvl6pPr marL="4200068" indent="0">
+            <a:lvl6pPr marL="1200150" indent="0">
               <a:buNone/>
-              <a:defRPr sz="1837"/>
+              <a:defRPr sz="525"/>
             </a:lvl6pPr>
-            <a:lvl7pPr marL="5040081" indent="0">
+            <a:lvl7pPr marL="1440180" indent="0">
               <a:buNone/>
-              <a:defRPr sz="1837"/>
+              <a:defRPr sz="525"/>
             </a:lvl7pPr>
-            <a:lvl8pPr marL="5880095" indent="0">
+            <a:lvl8pPr marL="1680210" indent="0">
               <a:buNone/>
-              <a:defRPr sz="1837"/>
+              <a:defRPr sz="525"/>
             </a:lvl8pPr>
-            <a:lvl9pPr marL="6720108" indent="0">
+            <a:lvl9pPr marL="1920240" indent="0">
               <a:buNone/>
-              <a:defRPr sz="1837"/>
+              <a:defRPr sz="525"/>
             </a:lvl9pPr>
           </a:lstStyle>
           <a:p>
@@ -2796,7 +2802,7 @@
           <a:p>
             <a:fld id="{C85938DC-A15A-4447-9D72-A08E970E92F8}" type="datetimeFigureOut">
               <a:rPr lang="de-DE" smtClean="0"/>
-              <a:t>11.07.24</a:t>
+              <a:t>13.07.24</a:t>
             </a:fld>
             <a:endParaRPr lang="de-DE"/>
           </a:p>
@@ -2847,7 +2853,7 @@
     </p:spTree>
     <p:extLst>
       <p:ext uri="{BB962C8B-B14F-4D97-AF65-F5344CB8AC3E}">
-        <p14:creationId xmlns:p14="http://schemas.microsoft.com/office/powerpoint/2010/main" val="726294380"/>
+        <p14:creationId xmlns:p14="http://schemas.microsoft.com/office/powerpoint/2010/main" val="3754317768"/>
       </p:ext>
     </p:extLst>
   </p:cSld>
@@ -2859,546 +2865,6 @@
 
 <file path=ppt/slideMasters/slideMaster1.xml><?xml version="1.0" encoding="utf-8"?>
 <p:sldMaster xmlns:a="http://schemas.openxmlformats.org/drawingml/2006/main" xmlns:r="http://schemas.openxmlformats.org/officeDocument/2006/relationships" xmlns:p="http://schemas.openxmlformats.org/presentationml/2006/main">
-  <p:cSld>
-    <p:bg>
-      <p:bgRef idx="1001">
-        <a:schemeClr val="bg1"/>
-      </p:bgRef>
-    </p:bg>
-    <p:spTree>
-      <p:nvGrpSpPr>
-        <p:cNvPr id="1" name=""/>
-        <p:cNvGrpSpPr/>
-        <p:nvPr/>
-      </p:nvGrpSpPr>
-      <p:grpSpPr>
-        <a:xfrm>
-          <a:off x="0" y="0"/>
-          <a:ext cx="0" cy="0"/>
-          <a:chOff x="0" y="0"/>
-          <a:chExt cx="0" cy="0"/>
-        </a:xfrm>
-      </p:grpSpPr>
-      <p:sp>
-        <p:nvSpPr>
-          <p:cNvPr id="2" name="Title Placeholder 1"/>
-          <p:cNvSpPr>
-            <a:spLocks noGrp="1"/>
-          </p:cNvSpPr>
-          <p:nvPr>
-            <p:ph type="title"/>
-          </p:nvPr>
-        </p:nvSpPr>
-        <p:spPr>
-          <a:xfrm>
-            <a:off x="1237546" y="670836"/>
-            <a:ext cx="15525572" cy="2435415"/>
-          </a:xfrm>
-          <a:prstGeom prst="rect">
-            <a:avLst/>
-          </a:prstGeom>
-        </p:spPr>
-        <p:txBody>
-          <a:bodyPr vert="horz" lIns="91440" tIns="45720" rIns="91440" bIns="45720" rtlCol="0" anchor="ctr">
-            <a:normAutofit/>
-          </a:bodyPr>
-          <a:lstStyle/>
-          <a:p>
-            <a:r>
-              <a:rPr lang="de-DE"/>
-              <a:t>Mastertitelformat bearbeiten</a:t>
-            </a:r>
-            <a:endParaRPr lang="en-US" dirty="0"/>
-          </a:p>
-        </p:txBody>
-      </p:sp>
-      <p:sp>
-        <p:nvSpPr>
-          <p:cNvPr id="3" name="Text Placeholder 2"/>
-          <p:cNvSpPr>
-            <a:spLocks noGrp="1"/>
-          </p:cNvSpPr>
-          <p:nvPr>
-            <p:ph type="body" idx="1"/>
-          </p:nvPr>
-        </p:nvSpPr>
-        <p:spPr>
-          <a:xfrm>
-            <a:off x="1237546" y="3354163"/>
-            <a:ext cx="15525572" cy="7994577"/>
-          </a:xfrm>
-          <a:prstGeom prst="rect">
-            <a:avLst/>
-          </a:prstGeom>
-        </p:spPr>
-        <p:txBody>
-          <a:bodyPr vert="horz" lIns="91440" tIns="45720" rIns="91440" bIns="45720" rtlCol="0">
-            <a:normAutofit/>
-          </a:bodyPr>
-          <a:lstStyle/>
-          <a:p>
-            <a:pPr lvl="0"/>
-            <a:r>
-              <a:rPr lang="de-DE"/>
-              <a:t>Mastertextformat bearbeiten</a:t>
-            </a:r>
-          </a:p>
-          <a:p>
-            <a:pPr lvl="1"/>
-            <a:r>
-              <a:rPr lang="de-DE"/>
-              <a:t>Zweite Ebene</a:t>
-            </a:r>
-          </a:p>
-          <a:p>
-            <a:pPr lvl="2"/>
-            <a:r>
-              <a:rPr lang="de-DE"/>
-              <a:t>Dritte Ebene</a:t>
-            </a:r>
-          </a:p>
-          <a:p>
-            <a:pPr lvl="3"/>
-            <a:r>
-              <a:rPr lang="de-DE"/>
-              <a:t>Vierte Ebene</a:t>
-            </a:r>
-          </a:p>
-          <a:p>
-            <a:pPr lvl="4"/>
-            <a:r>
-              <a:rPr lang="de-DE"/>
-              <a:t>Fünfte Ebene</a:t>
-            </a:r>
-            <a:endParaRPr lang="en-US" dirty="0"/>
-          </a:p>
-        </p:txBody>
-      </p:sp>
-      <p:sp>
-        <p:nvSpPr>
-          <p:cNvPr id="4" name="Date Placeholder 3"/>
-          <p:cNvSpPr>
-            <a:spLocks noGrp="1"/>
-          </p:cNvSpPr>
-          <p:nvPr>
-            <p:ph type="dt" sz="half" idx="2"/>
-          </p:nvPr>
-        </p:nvSpPr>
-        <p:spPr>
-          <a:xfrm>
-            <a:off x="1237546" y="11678325"/>
-            <a:ext cx="4050149" cy="670833"/>
-          </a:xfrm>
-          <a:prstGeom prst="rect">
-            <a:avLst/>
-          </a:prstGeom>
-        </p:spPr>
-        <p:txBody>
-          <a:bodyPr vert="horz" lIns="91440" tIns="45720" rIns="91440" bIns="45720" rtlCol="0" anchor="ctr"/>
-          <a:lstStyle>
-            <a:lvl1pPr algn="l">
-              <a:defRPr sz="2205">
-                <a:solidFill>
-                  <a:schemeClr val="tx1">
-                    <a:shade val="82000"/>
-                  </a:schemeClr>
-                </a:solidFill>
-              </a:defRPr>
-            </a:lvl1pPr>
-          </a:lstStyle>
-          <a:p>
-            <a:fld id="{C85938DC-A15A-4447-9D72-A08E970E92F8}" type="datetimeFigureOut">
-              <a:rPr lang="de-DE" smtClean="0"/>
-              <a:t>11.07.24</a:t>
-            </a:fld>
-            <a:endParaRPr lang="de-DE"/>
-          </a:p>
-        </p:txBody>
-      </p:sp>
-      <p:sp>
-        <p:nvSpPr>
-          <p:cNvPr id="5" name="Footer Placeholder 4"/>
-          <p:cNvSpPr>
-            <a:spLocks noGrp="1"/>
-          </p:cNvSpPr>
-          <p:nvPr>
-            <p:ph type="ftr" sz="quarter" idx="3"/>
-          </p:nvPr>
-        </p:nvSpPr>
-        <p:spPr>
-          <a:xfrm>
-            <a:off x="5962720" y="11678325"/>
-            <a:ext cx="6075224" cy="670833"/>
-          </a:xfrm>
-          <a:prstGeom prst="rect">
-            <a:avLst/>
-          </a:prstGeom>
-        </p:spPr>
-        <p:txBody>
-          <a:bodyPr vert="horz" lIns="91440" tIns="45720" rIns="91440" bIns="45720" rtlCol="0" anchor="ctr"/>
-          <a:lstStyle>
-            <a:lvl1pPr algn="ctr">
-              <a:defRPr sz="2205">
-                <a:solidFill>
-                  <a:schemeClr val="tx1">
-                    <a:shade val="82000"/>
-                  </a:schemeClr>
-                </a:solidFill>
-              </a:defRPr>
-            </a:lvl1pPr>
-          </a:lstStyle>
-          <a:p>
-            <a:endParaRPr lang="de-DE"/>
-          </a:p>
-        </p:txBody>
-      </p:sp>
-      <p:sp>
-        <p:nvSpPr>
-          <p:cNvPr id="6" name="Slide Number Placeholder 5"/>
-          <p:cNvSpPr>
-            <a:spLocks noGrp="1"/>
-          </p:cNvSpPr>
-          <p:nvPr>
-            <p:ph type="sldNum" sz="quarter" idx="4"/>
-          </p:nvPr>
-        </p:nvSpPr>
-        <p:spPr>
-          <a:xfrm>
-            <a:off x="12712968" y="11678325"/>
-            <a:ext cx="4050149" cy="670833"/>
-          </a:xfrm>
-          <a:prstGeom prst="rect">
-            <a:avLst/>
-          </a:prstGeom>
-        </p:spPr>
-        <p:txBody>
-          <a:bodyPr vert="horz" lIns="91440" tIns="45720" rIns="91440" bIns="45720" rtlCol="0" anchor="ctr"/>
-          <a:lstStyle>
-            <a:lvl1pPr algn="r">
-              <a:defRPr sz="2205">
-                <a:solidFill>
-                  <a:schemeClr val="tx1">
-                    <a:shade val="82000"/>
-                  </a:schemeClr>
-                </a:solidFill>
-              </a:defRPr>
-            </a:lvl1pPr>
-          </a:lstStyle>
-          <a:p>
-            <a:fld id="{B2F17B9A-90A9-4D44-A4EB-73F65F9C744A}" type="slidenum">
-              <a:rPr lang="de-DE" smtClean="0"/>
-              <a:t>‹Nr.›</a:t>
-            </a:fld>
-            <a:endParaRPr lang="de-DE"/>
-          </a:p>
-        </p:txBody>
-      </p:sp>
-    </p:spTree>
-    <p:extLst>
-      <p:ext uri="{BB962C8B-B14F-4D97-AF65-F5344CB8AC3E}">
-        <p14:creationId xmlns:p14="http://schemas.microsoft.com/office/powerpoint/2010/main" val="1230724558"/>
-      </p:ext>
-    </p:extLst>
-  </p:cSld>
-  <p:clrMap bg1="dk1" tx1="lt1" bg2="dk2" tx2="lt2" accent1="accent1" accent2="accent2" accent3="accent3" accent4="accent4" accent5="accent5" accent6="accent6" hlink="hlink" folHlink="folHlink"/>
-  <p:sldLayoutIdLst>
-    <p:sldLayoutId id="2147483685" r:id="rId1"/>
-    <p:sldLayoutId id="2147483686" r:id="rId2"/>
-    <p:sldLayoutId id="2147483687" r:id="rId3"/>
-    <p:sldLayoutId id="2147483688" r:id="rId4"/>
-    <p:sldLayoutId id="2147483689" r:id="rId5"/>
-    <p:sldLayoutId id="2147483690" r:id="rId6"/>
-    <p:sldLayoutId id="2147483691" r:id="rId7"/>
-    <p:sldLayoutId id="2147483692" r:id="rId8"/>
-    <p:sldLayoutId id="2147483693" r:id="rId9"/>
-    <p:sldLayoutId id="2147483694" r:id="rId10"/>
-    <p:sldLayoutId id="2147483695" r:id="rId11"/>
-  </p:sldLayoutIdLst>
-  <p:txStyles>
-    <p:titleStyle>
-      <a:lvl1pPr algn="l" defTabSz="1680027" rtl="0" eaLnBrk="1" latinLnBrk="0" hangingPunct="1">
-        <a:lnSpc>
-          <a:spcPct val="90000"/>
-        </a:lnSpc>
-        <a:spcBef>
-          <a:spcPct val="0"/>
-        </a:spcBef>
-        <a:buNone/>
-        <a:defRPr sz="8084" kern="1200">
-          <a:solidFill>
-            <a:schemeClr val="tx1"/>
-          </a:solidFill>
-          <a:latin typeface="+mj-lt"/>
-          <a:ea typeface="+mj-ea"/>
-          <a:cs typeface="+mj-cs"/>
-        </a:defRPr>
-      </a:lvl1pPr>
-    </p:titleStyle>
-    <p:bodyStyle>
-      <a:lvl1pPr marL="420007" indent="-420007" algn="l" defTabSz="1680027" rtl="0" eaLnBrk="1" latinLnBrk="0" hangingPunct="1">
-        <a:lnSpc>
-          <a:spcPct val="90000"/>
-        </a:lnSpc>
-        <a:spcBef>
-          <a:spcPts val="1837"/>
-        </a:spcBef>
-        <a:buFont typeface="Arial" panose="020B0604020202020204" pitchFamily="34" charset="0"/>
-        <a:buChar char="•"/>
-        <a:defRPr sz="5144" kern="1200">
-          <a:solidFill>
-            <a:schemeClr val="tx1"/>
-          </a:solidFill>
-          <a:latin typeface="+mn-lt"/>
-          <a:ea typeface="+mn-ea"/>
-          <a:cs typeface="+mn-cs"/>
-        </a:defRPr>
-      </a:lvl1pPr>
-      <a:lvl2pPr marL="1260020" indent="-420007" algn="l" defTabSz="1680027" rtl="0" eaLnBrk="1" latinLnBrk="0" hangingPunct="1">
-        <a:lnSpc>
-          <a:spcPct val="90000"/>
-        </a:lnSpc>
-        <a:spcBef>
-          <a:spcPts val="919"/>
-        </a:spcBef>
-        <a:buFont typeface="Arial" panose="020B0604020202020204" pitchFamily="34" charset="0"/>
-        <a:buChar char="•"/>
-        <a:defRPr sz="4410" kern="1200">
-          <a:solidFill>
-            <a:schemeClr val="tx1"/>
-          </a:solidFill>
-          <a:latin typeface="+mn-lt"/>
-          <a:ea typeface="+mn-ea"/>
-          <a:cs typeface="+mn-cs"/>
-        </a:defRPr>
-      </a:lvl2pPr>
-      <a:lvl3pPr marL="2100034" indent="-420007" algn="l" defTabSz="1680027" rtl="0" eaLnBrk="1" latinLnBrk="0" hangingPunct="1">
-        <a:lnSpc>
-          <a:spcPct val="90000"/>
-        </a:lnSpc>
-        <a:spcBef>
-          <a:spcPts val="919"/>
-        </a:spcBef>
-        <a:buFont typeface="Arial" panose="020B0604020202020204" pitchFamily="34" charset="0"/>
-        <a:buChar char="•"/>
-        <a:defRPr sz="3675" kern="1200">
-          <a:solidFill>
-            <a:schemeClr val="tx1"/>
-          </a:solidFill>
-          <a:latin typeface="+mn-lt"/>
-          <a:ea typeface="+mn-ea"/>
-          <a:cs typeface="+mn-cs"/>
-        </a:defRPr>
-      </a:lvl3pPr>
-      <a:lvl4pPr marL="2940047" indent="-420007" algn="l" defTabSz="1680027" rtl="0" eaLnBrk="1" latinLnBrk="0" hangingPunct="1">
-        <a:lnSpc>
-          <a:spcPct val="90000"/>
-        </a:lnSpc>
-        <a:spcBef>
-          <a:spcPts val="919"/>
-        </a:spcBef>
-        <a:buFont typeface="Arial" panose="020B0604020202020204" pitchFamily="34" charset="0"/>
-        <a:buChar char="•"/>
-        <a:defRPr sz="3307" kern="1200">
-          <a:solidFill>
-            <a:schemeClr val="tx1"/>
-          </a:solidFill>
-          <a:latin typeface="+mn-lt"/>
-          <a:ea typeface="+mn-ea"/>
-          <a:cs typeface="+mn-cs"/>
-        </a:defRPr>
-      </a:lvl4pPr>
-      <a:lvl5pPr marL="3780061" indent="-420007" algn="l" defTabSz="1680027" rtl="0" eaLnBrk="1" latinLnBrk="0" hangingPunct="1">
-        <a:lnSpc>
-          <a:spcPct val="90000"/>
-        </a:lnSpc>
-        <a:spcBef>
-          <a:spcPts val="919"/>
-        </a:spcBef>
-        <a:buFont typeface="Arial" panose="020B0604020202020204" pitchFamily="34" charset="0"/>
-        <a:buChar char="•"/>
-        <a:defRPr sz="3307" kern="1200">
-          <a:solidFill>
-            <a:schemeClr val="tx1"/>
-          </a:solidFill>
-          <a:latin typeface="+mn-lt"/>
-          <a:ea typeface="+mn-ea"/>
-          <a:cs typeface="+mn-cs"/>
-        </a:defRPr>
-      </a:lvl5pPr>
-      <a:lvl6pPr marL="4620075" indent="-420007" algn="l" defTabSz="1680027" rtl="0" eaLnBrk="1" latinLnBrk="0" hangingPunct="1">
-        <a:lnSpc>
-          <a:spcPct val="90000"/>
-        </a:lnSpc>
-        <a:spcBef>
-          <a:spcPts val="919"/>
-        </a:spcBef>
-        <a:buFont typeface="Arial" panose="020B0604020202020204" pitchFamily="34" charset="0"/>
-        <a:buChar char="•"/>
-        <a:defRPr sz="3307" kern="1200">
-          <a:solidFill>
-            <a:schemeClr val="tx1"/>
-          </a:solidFill>
-          <a:latin typeface="+mn-lt"/>
-          <a:ea typeface="+mn-ea"/>
-          <a:cs typeface="+mn-cs"/>
-        </a:defRPr>
-      </a:lvl6pPr>
-      <a:lvl7pPr marL="5460088" indent="-420007" algn="l" defTabSz="1680027" rtl="0" eaLnBrk="1" latinLnBrk="0" hangingPunct="1">
-        <a:lnSpc>
-          <a:spcPct val="90000"/>
-        </a:lnSpc>
-        <a:spcBef>
-          <a:spcPts val="919"/>
-        </a:spcBef>
-        <a:buFont typeface="Arial" panose="020B0604020202020204" pitchFamily="34" charset="0"/>
-        <a:buChar char="•"/>
-        <a:defRPr sz="3307" kern="1200">
-          <a:solidFill>
-            <a:schemeClr val="tx1"/>
-          </a:solidFill>
-          <a:latin typeface="+mn-lt"/>
-          <a:ea typeface="+mn-ea"/>
-          <a:cs typeface="+mn-cs"/>
-        </a:defRPr>
-      </a:lvl7pPr>
-      <a:lvl8pPr marL="6300102" indent="-420007" algn="l" defTabSz="1680027" rtl="0" eaLnBrk="1" latinLnBrk="0" hangingPunct="1">
-        <a:lnSpc>
-          <a:spcPct val="90000"/>
-        </a:lnSpc>
-        <a:spcBef>
-          <a:spcPts val="919"/>
-        </a:spcBef>
-        <a:buFont typeface="Arial" panose="020B0604020202020204" pitchFamily="34" charset="0"/>
-        <a:buChar char="•"/>
-        <a:defRPr sz="3307" kern="1200">
-          <a:solidFill>
-            <a:schemeClr val="tx1"/>
-          </a:solidFill>
-          <a:latin typeface="+mn-lt"/>
-          <a:ea typeface="+mn-ea"/>
-          <a:cs typeface="+mn-cs"/>
-        </a:defRPr>
-      </a:lvl8pPr>
-      <a:lvl9pPr marL="7140115" indent="-420007" algn="l" defTabSz="1680027" rtl="0" eaLnBrk="1" latinLnBrk="0" hangingPunct="1">
-        <a:lnSpc>
-          <a:spcPct val="90000"/>
-        </a:lnSpc>
-        <a:spcBef>
-          <a:spcPts val="919"/>
-        </a:spcBef>
-        <a:buFont typeface="Arial" panose="020B0604020202020204" pitchFamily="34" charset="0"/>
-        <a:buChar char="•"/>
-        <a:defRPr sz="3307" kern="1200">
-          <a:solidFill>
-            <a:schemeClr val="tx1"/>
-          </a:solidFill>
-          <a:latin typeface="+mn-lt"/>
-          <a:ea typeface="+mn-ea"/>
-          <a:cs typeface="+mn-cs"/>
-        </a:defRPr>
-      </a:lvl9pPr>
-    </p:bodyStyle>
-    <p:otherStyle>
-      <a:defPPr>
-        <a:defRPr lang="en-US"/>
-      </a:defPPr>
-      <a:lvl1pPr marL="0" algn="l" defTabSz="1680027" rtl="0" eaLnBrk="1" latinLnBrk="0" hangingPunct="1">
-        <a:defRPr sz="3307" kern="1200">
-          <a:solidFill>
-            <a:schemeClr val="tx1"/>
-          </a:solidFill>
-          <a:latin typeface="+mn-lt"/>
-          <a:ea typeface="+mn-ea"/>
-          <a:cs typeface="+mn-cs"/>
-        </a:defRPr>
-      </a:lvl1pPr>
-      <a:lvl2pPr marL="840014" algn="l" defTabSz="1680027" rtl="0" eaLnBrk="1" latinLnBrk="0" hangingPunct="1">
-        <a:defRPr sz="3307" kern="1200">
-          <a:solidFill>
-            <a:schemeClr val="tx1"/>
-          </a:solidFill>
-          <a:latin typeface="+mn-lt"/>
-          <a:ea typeface="+mn-ea"/>
-          <a:cs typeface="+mn-cs"/>
-        </a:defRPr>
-      </a:lvl2pPr>
-      <a:lvl3pPr marL="1680027" algn="l" defTabSz="1680027" rtl="0" eaLnBrk="1" latinLnBrk="0" hangingPunct="1">
-        <a:defRPr sz="3307" kern="1200">
-          <a:solidFill>
-            <a:schemeClr val="tx1"/>
-          </a:solidFill>
-          <a:latin typeface="+mn-lt"/>
-          <a:ea typeface="+mn-ea"/>
-          <a:cs typeface="+mn-cs"/>
-        </a:defRPr>
-      </a:lvl3pPr>
-      <a:lvl4pPr marL="2520041" algn="l" defTabSz="1680027" rtl="0" eaLnBrk="1" latinLnBrk="0" hangingPunct="1">
-        <a:defRPr sz="3307" kern="1200">
-          <a:solidFill>
-            <a:schemeClr val="tx1"/>
-          </a:solidFill>
-          <a:latin typeface="+mn-lt"/>
-          <a:ea typeface="+mn-ea"/>
-          <a:cs typeface="+mn-cs"/>
-        </a:defRPr>
-      </a:lvl4pPr>
-      <a:lvl5pPr marL="3360054" algn="l" defTabSz="1680027" rtl="0" eaLnBrk="1" latinLnBrk="0" hangingPunct="1">
-        <a:defRPr sz="3307" kern="1200">
-          <a:solidFill>
-            <a:schemeClr val="tx1"/>
-          </a:solidFill>
-          <a:latin typeface="+mn-lt"/>
-          <a:ea typeface="+mn-ea"/>
-          <a:cs typeface="+mn-cs"/>
-        </a:defRPr>
-      </a:lvl5pPr>
-      <a:lvl6pPr marL="4200068" algn="l" defTabSz="1680027" rtl="0" eaLnBrk="1" latinLnBrk="0" hangingPunct="1">
-        <a:defRPr sz="3307" kern="1200">
-          <a:solidFill>
-            <a:schemeClr val="tx1"/>
-          </a:solidFill>
-          <a:latin typeface="+mn-lt"/>
-          <a:ea typeface="+mn-ea"/>
-          <a:cs typeface="+mn-cs"/>
-        </a:defRPr>
-      </a:lvl6pPr>
-      <a:lvl7pPr marL="5040081" algn="l" defTabSz="1680027" rtl="0" eaLnBrk="1" latinLnBrk="0" hangingPunct="1">
-        <a:defRPr sz="3307" kern="1200">
-          <a:solidFill>
-            <a:schemeClr val="tx1"/>
-          </a:solidFill>
-          <a:latin typeface="+mn-lt"/>
-          <a:ea typeface="+mn-ea"/>
-          <a:cs typeface="+mn-cs"/>
-        </a:defRPr>
-      </a:lvl7pPr>
-      <a:lvl8pPr marL="5880095" algn="l" defTabSz="1680027" rtl="0" eaLnBrk="1" latinLnBrk="0" hangingPunct="1">
-        <a:defRPr sz="3307" kern="1200">
-          <a:solidFill>
-            <a:schemeClr val="tx1"/>
-          </a:solidFill>
-          <a:latin typeface="+mn-lt"/>
-          <a:ea typeface="+mn-ea"/>
-          <a:cs typeface="+mn-cs"/>
-        </a:defRPr>
-      </a:lvl8pPr>
-      <a:lvl9pPr marL="6720108" algn="l" defTabSz="1680027" rtl="0" eaLnBrk="1" latinLnBrk="0" hangingPunct="1">
-        <a:defRPr sz="3307" kern="1200">
-          <a:solidFill>
-            <a:schemeClr val="tx1"/>
-          </a:solidFill>
-          <a:latin typeface="+mn-lt"/>
-          <a:ea typeface="+mn-ea"/>
-          <a:cs typeface="+mn-cs"/>
-        </a:defRPr>
-      </a:lvl9pPr>
-    </p:otherStyle>
-  </p:txStyles>
-</p:sldMaster>
-</file>
-
-<file path=ppt/slides/slide1.xml><?xml version="1.0" encoding="utf-8"?>
-<p:sld xmlns:a="http://schemas.openxmlformats.org/drawingml/2006/main" xmlns:r="http://schemas.openxmlformats.org/officeDocument/2006/relationships" xmlns:p="http://schemas.openxmlformats.org/presentationml/2006/main">
   <p:cSld>
     <p:bg>
       <p:bgPr>
@@ -3424,6 +2890,541 @@
       </p:grpSpPr>
       <p:sp>
         <p:nvSpPr>
+          <p:cNvPr id="2" name="Title Placeholder 1"/>
+          <p:cNvSpPr>
+            <a:spLocks noGrp="1"/>
+          </p:cNvSpPr>
+          <p:nvPr>
+            <p:ph type="title"/>
+          </p:nvPr>
+        </p:nvSpPr>
+        <p:spPr>
+          <a:xfrm>
+            <a:off x="494953" y="191691"/>
+            <a:ext cx="6209407" cy="695921"/>
+          </a:xfrm>
+          <a:prstGeom prst="rect">
+            <a:avLst/>
+          </a:prstGeom>
+        </p:spPr>
+        <p:txBody>
+          <a:bodyPr vert="horz" lIns="91440" tIns="45720" rIns="91440" bIns="45720" rtlCol="0" anchor="ctr">
+            <a:normAutofit/>
+          </a:bodyPr>
+          <a:lstStyle/>
+          <a:p>
+            <a:r>
+              <a:rPr lang="de-DE"/>
+              <a:t>Mastertitelformat bearbeiten</a:t>
+            </a:r>
+            <a:endParaRPr lang="en-US" dirty="0"/>
+          </a:p>
+        </p:txBody>
+      </p:sp>
+      <p:sp>
+        <p:nvSpPr>
+          <p:cNvPr id="3" name="Text Placeholder 2"/>
+          <p:cNvSpPr>
+            <a:spLocks noGrp="1"/>
+          </p:cNvSpPr>
+          <p:nvPr>
+            <p:ph type="body" idx="1"/>
+          </p:nvPr>
+        </p:nvSpPr>
+        <p:spPr>
+          <a:xfrm>
+            <a:off x="494953" y="958453"/>
+            <a:ext cx="6209407" cy="2284452"/>
+          </a:xfrm>
+          <a:prstGeom prst="rect">
+            <a:avLst/>
+          </a:prstGeom>
+        </p:spPr>
+        <p:txBody>
+          <a:bodyPr vert="horz" lIns="91440" tIns="45720" rIns="91440" bIns="45720" rtlCol="0">
+            <a:normAutofit/>
+          </a:bodyPr>
+          <a:lstStyle/>
+          <a:p>
+            <a:pPr lvl="0"/>
+            <a:r>
+              <a:rPr lang="de-DE"/>
+              <a:t>Mastertextformat bearbeiten</a:t>
+            </a:r>
+          </a:p>
+          <a:p>
+            <a:pPr lvl="1"/>
+            <a:r>
+              <a:rPr lang="de-DE"/>
+              <a:t>Zweite Ebene</a:t>
+            </a:r>
+          </a:p>
+          <a:p>
+            <a:pPr lvl="2"/>
+            <a:r>
+              <a:rPr lang="de-DE"/>
+              <a:t>Dritte Ebene</a:t>
+            </a:r>
+          </a:p>
+          <a:p>
+            <a:pPr lvl="3"/>
+            <a:r>
+              <a:rPr lang="de-DE"/>
+              <a:t>Vierte Ebene</a:t>
+            </a:r>
+          </a:p>
+          <a:p>
+            <a:pPr lvl="4"/>
+            <a:r>
+              <a:rPr lang="de-DE"/>
+              <a:t>Fünfte Ebene</a:t>
+            </a:r>
+            <a:endParaRPr lang="en-US" dirty="0"/>
+          </a:p>
+        </p:txBody>
+      </p:sp>
+      <p:sp>
+        <p:nvSpPr>
+          <p:cNvPr id="4" name="Date Placeholder 3"/>
+          <p:cNvSpPr>
+            <a:spLocks noGrp="1"/>
+          </p:cNvSpPr>
+          <p:nvPr>
+            <p:ph type="dt" sz="half" idx="2"/>
+          </p:nvPr>
+        </p:nvSpPr>
+        <p:spPr>
+          <a:xfrm>
+            <a:off x="494953" y="3337084"/>
+            <a:ext cx="1619845" cy="191691"/>
+          </a:xfrm>
+          <a:prstGeom prst="rect">
+            <a:avLst/>
+          </a:prstGeom>
+        </p:spPr>
+        <p:txBody>
+          <a:bodyPr vert="horz" lIns="91440" tIns="45720" rIns="91440" bIns="45720" rtlCol="0" anchor="ctr"/>
+          <a:lstStyle>
+            <a:lvl1pPr algn="l">
+              <a:defRPr sz="630">
+                <a:solidFill>
+                  <a:schemeClr val="tx1">
+                    <a:shade val="82000"/>
+                  </a:schemeClr>
+                </a:solidFill>
+              </a:defRPr>
+            </a:lvl1pPr>
+          </a:lstStyle>
+          <a:p>
+            <a:fld id="{C85938DC-A15A-4447-9D72-A08E970E92F8}" type="datetimeFigureOut">
+              <a:rPr lang="de-DE" smtClean="0"/>
+              <a:t>13.07.24</a:t>
+            </a:fld>
+            <a:endParaRPr lang="de-DE"/>
+          </a:p>
+        </p:txBody>
+      </p:sp>
+      <p:sp>
+        <p:nvSpPr>
+          <p:cNvPr id="5" name="Footer Placeholder 4"/>
+          <p:cNvSpPr>
+            <a:spLocks noGrp="1"/>
+          </p:cNvSpPr>
+          <p:nvPr>
+            <p:ph type="ftr" sz="quarter" idx="3"/>
+          </p:nvPr>
+        </p:nvSpPr>
+        <p:spPr>
+          <a:xfrm>
+            <a:off x="2384773" y="3337084"/>
+            <a:ext cx="2429768" cy="191691"/>
+          </a:xfrm>
+          <a:prstGeom prst="rect">
+            <a:avLst/>
+          </a:prstGeom>
+        </p:spPr>
+        <p:txBody>
+          <a:bodyPr vert="horz" lIns="91440" tIns="45720" rIns="91440" bIns="45720" rtlCol="0" anchor="ctr"/>
+          <a:lstStyle>
+            <a:lvl1pPr algn="ctr">
+              <a:defRPr sz="630">
+                <a:solidFill>
+                  <a:schemeClr val="tx1">
+                    <a:shade val="82000"/>
+                  </a:schemeClr>
+                </a:solidFill>
+              </a:defRPr>
+            </a:lvl1pPr>
+          </a:lstStyle>
+          <a:p>
+            <a:endParaRPr lang="de-DE"/>
+          </a:p>
+        </p:txBody>
+      </p:sp>
+      <p:sp>
+        <p:nvSpPr>
+          <p:cNvPr id="6" name="Slide Number Placeholder 5"/>
+          <p:cNvSpPr>
+            <a:spLocks noGrp="1"/>
+          </p:cNvSpPr>
+          <p:nvPr>
+            <p:ph type="sldNum" sz="quarter" idx="4"/>
+          </p:nvPr>
+        </p:nvSpPr>
+        <p:spPr>
+          <a:xfrm>
+            <a:off x="5084515" y="3337084"/>
+            <a:ext cx="1619845" cy="191691"/>
+          </a:xfrm>
+          <a:prstGeom prst="rect">
+            <a:avLst/>
+          </a:prstGeom>
+        </p:spPr>
+        <p:txBody>
+          <a:bodyPr vert="horz" lIns="91440" tIns="45720" rIns="91440" bIns="45720" rtlCol="0" anchor="ctr"/>
+          <a:lstStyle>
+            <a:lvl1pPr algn="r">
+              <a:defRPr sz="630">
+                <a:solidFill>
+                  <a:schemeClr val="tx1">
+                    <a:shade val="82000"/>
+                  </a:schemeClr>
+                </a:solidFill>
+              </a:defRPr>
+            </a:lvl1pPr>
+          </a:lstStyle>
+          <a:p>
+            <a:fld id="{B2F17B9A-90A9-4D44-A4EB-73F65F9C744A}" type="slidenum">
+              <a:rPr lang="de-DE" smtClean="0"/>
+              <a:t>‹Nr.›</a:t>
+            </a:fld>
+            <a:endParaRPr lang="de-DE"/>
+          </a:p>
+        </p:txBody>
+      </p:sp>
+    </p:spTree>
+    <p:extLst>
+      <p:ext uri="{BB962C8B-B14F-4D97-AF65-F5344CB8AC3E}">
+        <p14:creationId xmlns:p14="http://schemas.microsoft.com/office/powerpoint/2010/main" val="3305483955"/>
+      </p:ext>
+    </p:extLst>
+  </p:cSld>
+  <p:clrMap bg1="dk1" tx1="lt1" bg2="dk2" tx2="lt2" accent1="accent1" accent2="accent2" accent3="accent3" accent4="accent4" accent5="accent5" accent6="accent6" hlink="hlink" folHlink="folHlink"/>
+  <p:sldLayoutIdLst>
+    <p:sldLayoutId id="2147483709" r:id="rId1"/>
+    <p:sldLayoutId id="2147483710" r:id="rId2"/>
+    <p:sldLayoutId id="2147483711" r:id="rId3"/>
+    <p:sldLayoutId id="2147483712" r:id="rId4"/>
+    <p:sldLayoutId id="2147483713" r:id="rId5"/>
+    <p:sldLayoutId id="2147483714" r:id="rId6"/>
+    <p:sldLayoutId id="2147483715" r:id="rId7"/>
+    <p:sldLayoutId id="2147483716" r:id="rId8"/>
+    <p:sldLayoutId id="2147483717" r:id="rId9"/>
+    <p:sldLayoutId id="2147483718" r:id="rId10"/>
+    <p:sldLayoutId id="2147483719" r:id="rId11"/>
+  </p:sldLayoutIdLst>
+  <p:txStyles>
+    <p:titleStyle>
+      <a:lvl1pPr algn="l" defTabSz="480060" rtl="0" eaLnBrk="1" latinLnBrk="0" hangingPunct="1">
+        <a:lnSpc>
+          <a:spcPct val="90000"/>
+        </a:lnSpc>
+        <a:spcBef>
+          <a:spcPct val="0"/>
+        </a:spcBef>
+        <a:buNone/>
+        <a:defRPr sz="2310" kern="1200">
+          <a:solidFill>
+            <a:schemeClr val="tx1"/>
+          </a:solidFill>
+          <a:latin typeface="+mj-lt"/>
+          <a:ea typeface="+mj-ea"/>
+          <a:cs typeface="+mj-cs"/>
+        </a:defRPr>
+      </a:lvl1pPr>
+    </p:titleStyle>
+    <p:bodyStyle>
+      <a:lvl1pPr marL="120015" indent="-120015" algn="l" defTabSz="480060" rtl="0" eaLnBrk="1" latinLnBrk="0" hangingPunct="1">
+        <a:lnSpc>
+          <a:spcPct val="90000"/>
+        </a:lnSpc>
+        <a:spcBef>
+          <a:spcPts val="525"/>
+        </a:spcBef>
+        <a:buFont typeface="Arial" panose="020B0604020202020204" pitchFamily="34" charset="0"/>
+        <a:buChar char="•"/>
+        <a:defRPr sz="1470" kern="1200">
+          <a:solidFill>
+            <a:schemeClr val="tx1"/>
+          </a:solidFill>
+          <a:latin typeface="+mn-lt"/>
+          <a:ea typeface="+mn-ea"/>
+          <a:cs typeface="+mn-cs"/>
+        </a:defRPr>
+      </a:lvl1pPr>
+      <a:lvl2pPr marL="360045" indent="-120015" algn="l" defTabSz="480060" rtl="0" eaLnBrk="1" latinLnBrk="0" hangingPunct="1">
+        <a:lnSpc>
+          <a:spcPct val="90000"/>
+        </a:lnSpc>
+        <a:spcBef>
+          <a:spcPts val="263"/>
+        </a:spcBef>
+        <a:buFont typeface="Arial" panose="020B0604020202020204" pitchFamily="34" charset="0"/>
+        <a:buChar char="•"/>
+        <a:defRPr sz="1260" kern="1200">
+          <a:solidFill>
+            <a:schemeClr val="tx1"/>
+          </a:solidFill>
+          <a:latin typeface="+mn-lt"/>
+          <a:ea typeface="+mn-ea"/>
+          <a:cs typeface="+mn-cs"/>
+        </a:defRPr>
+      </a:lvl2pPr>
+      <a:lvl3pPr marL="600075" indent="-120015" algn="l" defTabSz="480060" rtl="0" eaLnBrk="1" latinLnBrk="0" hangingPunct="1">
+        <a:lnSpc>
+          <a:spcPct val="90000"/>
+        </a:lnSpc>
+        <a:spcBef>
+          <a:spcPts val="263"/>
+        </a:spcBef>
+        <a:buFont typeface="Arial" panose="020B0604020202020204" pitchFamily="34" charset="0"/>
+        <a:buChar char="•"/>
+        <a:defRPr sz="1050" kern="1200">
+          <a:solidFill>
+            <a:schemeClr val="tx1"/>
+          </a:solidFill>
+          <a:latin typeface="+mn-lt"/>
+          <a:ea typeface="+mn-ea"/>
+          <a:cs typeface="+mn-cs"/>
+        </a:defRPr>
+      </a:lvl3pPr>
+      <a:lvl4pPr marL="840105" indent="-120015" algn="l" defTabSz="480060" rtl="0" eaLnBrk="1" latinLnBrk="0" hangingPunct="1">
+        <a:lnSpc>
+          <a:spcPct val="90000"/>
+        </a:lnSpc>
+        <a:spcBef>
+          <a:spcPts val="263"/>
+        </a:spcBef>
+        <a:buFont typeface="Arial" panose="020B0604020202020204" pitchFamily="34" charset="0"/>
+        <a:buChar char="•"/>
+        <a:defRPr sz="945" kern="1200">
+          <a:solidFill>
+            <a:schemeClr val="tx1"/>
+          </a:solidFill>
+          <a:latin typeface="+mn-lt"/>
+          <a:ea typeface="+mn-ea"/>
+          <a:cs typeface="+mn-cs"/>
+        </a:defRPr>
+      </a:lvl4pPr>
+      <a:lvl5pPr marL="1080135" indent="-120015" algn="l" defTabSz="480060" rtl="0" eaLnBrk="1" latinLnBrk="0" hangingPunct="1">
+        <a:lnSpc>
+          <a:spcPct val="90000"/>
+        </a:lnSpc>
+        <a:spcBef>
+          <a:spcPts val="263"/>
+        </a:spcBef>
+        <a:buFont typeface="Arial" panose="020B0604020202020204" pitchFamily="34" charset="0"/>
+        <a:buChar char="•"/>
+        <a:defRPr sz="945" kern="1200">
+          <a:solidFill>
+            <a:schemeClr val="tx1"/>
+          </a:solidFill>
+          <a:latin typeface="+mn-lt"/>
+          <a:ea typeface="+mn-ea"/>
+          <a:cs typeface="+mn-cs"/>
+        </a:defRPr>
+      </a:lvl5pPr>
+      <a:lvl6pPr marL="1320165" indent="-120015" algn="l" defTabSz="480060" rtl="0" eaLnBrk="1" latinLnBrk="0" hangingPunct="1">
+        <a:lnSpc>
+          <a:spcPct val="90000"/>
+        </a:lnSpc>
+        <a:spcBef>
+          <a:spcPts val="263"/>
+        </a:spcBef>
+        <a:buFont typeface="Arial" panose="020B0604020202020204" pitchFamily="34" charset="0"/>
+        <a:buChar char="•"/>
+        <a:defRPr sz="945" kern="1200">
+          <a:solidFill>
+            <a:schemeClr val="tx1"/>
+          </a:solidFill>
+          <a:latin typeface="+mn-lt"/>
+          <a:ea typeface="+mn-ea"/>
+          <a:cs typeface="+mn-cs"/>
+        </a:defRPr>
+      </a:lvl6pPr>
+      <a:lvl7pPr marL="1560195" indent="-120015" algn="l" defTabSz="480060" rtl="0" eaLnBrk="1" latinLnBrk="0" hangingPunct="1">
+        <a:lnSpc>
+          <a:spcPct val="90000"/>
+        </a:lnSpc>
+        <a:spcBef>
+          <a:spcPts val="263"/>
+        </a:spcBef>
+        <a:buFont typeface="Arial" panose="020B0604020202020204" pitchFamily="34" charset="0"/>
+        <a:buChar char="•"/>
+        <a:defRPr sz="945" kern="1200">
+          <a:solidFill>
+            <a:schemeClr val="tx1"/>
+          </a:solidFill>
+          <a:latin typeface="+mn-lt"/>
+          <a:ea typeface="+mn-ea"/>
+          <a:cs typeface="+mn-cs"/>
+        </a:defRPr>
+      </a:lvl7pPr>
+      <a:lvl8pPr marL="1800225" indent="-120015" algn="l" defTabSz="480060" rtl="0" eaLnBrk="1" latinLnBrk="0" hangingPunct="1">
+        <a:lnSpc>
+          <a:spcPct val="90000"/>
+        </a:lnSpc>
+        <a:spcBef>
+          <a:spcPts val="263"/>
+        </a:spcBef>
+        <a:buFont typeface="Arial" panose="020B0604020202020204" pitchFamily="34" charset="0"/>
+        <a:buChar char="•"/>
+        <a:defRPr sz="945" kern="1200">
+          <a:solidFill>
+            <a:schemeClr val="tx1"/>
+          </a:solidFill>
+          <a:latin typeface="+mn-lt"/>
+          <a:ea typeface="+mn-ea"/>
+          <a:cs typeface="+mn-cs"/>
+        </a:defRPr>
+      </a:lvl8pPr>
+      <a:lvl9pPr marL="2040255" indent="-120015" algn="l" defTabSz="480060" rtl="0" eaLnBrk="1" latinLnBrk="0" hangingPunct="1">
+        <a:lnSpc>
+          <a:spcPct val="90000"/>
+        </a:lnSpc>
+        <a:spcBef>
+          <a:spcPts val="263"/>
+        </a:spcBef>
+        <a:buFont typeface="Arial" panose="020B0604020202020204" pitchFamily="34" charset="0"/>
+        <a:buChar char="•"/>
+        <a:defRPr sz="945" kern="1200">
+          <a:solidFill>
+            <a:schemeClr val="tx1"/>
+          </a:solidFill>
+          <a:latin typeface="+mn-lt"/>
+          <a:ea typeface="+mn-ea"/>
+          <a:cs typeface="+mn-cs"/>
+        </a:defRPr>
+      </a:lvl9pPr>
+    </p:bodyStyle>
+    <p:otherStyle>
+      <a:defPPr>
+        <a:defRPr lang="en-US"/>
+      </a:defPPr>
+      <a:lvl1pPr marL="0" algn="l" defTabSz="480060" rtl="0" eaLnBrk="1" latinLnBrk="0" hangingPunct="1">
+        <a:defRPr sz="945" kern="1200">
+          <a:solidFill>
+            <a:schemeClr val="tx1"/>
+          </a:solidFill>
+          <a:latin typeface="+mn-lt"/>
+          <a:ea typeface="+mn-ea"/>
+          <a:cs typeface="+mn-cs"/>
+        </a:defRPr>
+      </a:lvl1pPr>
+      <a:lvl2pPr marL="240030" algn="l" defTabSz="480060" rtl="0" eaLnBrk="1" latinLnBrk="0" hangingPunct="1">
+        <a:defRPr sz="945" kern="1200">
+          <a:solidFill>
+            <a:schemeClr val="tx1"/>
+          </a:solidFill>
+          <a:latin typeface="+mn-lt"/>
+          <a:ea typeface="+mn-ea"/>
+          <a:cs typeface="+mn-cs"/>
+        </a:defRPr>
+      </a:lvl2pPr>
+      <a:lvl3pPr marL="480060" algn="l" defTabSz="480060" rtl="0" eaLnBrk="1" latinLnBrk="0" hangingPunct="1">
+        <a:defRPr sz="945" kern="1200">
+          <a:solidFill>
+            <a:schemeClr val="tx1"/>
+          </a:solidFill>
+          <a:latin typeface="+mn-lt"/>
+          <a:ea typeface="+mn-ea"/>
+          <a:cs typeface="+mn-cs"/>
+        </a:defRPr>
+      </a:lvl3pPr>
+      <a:lvl4pPr marL="720090" algn="l" defTabSz="480060" rtl="0" eaLnBrk="1" latinLnBrk="0" hangingPunct="1">
+        <a:defRPr sz="945" kern="1200">
+          <a:solidFill>
+            <a:schemeClr val="tx1"/>
+          </a:solidFill>
+          <a:latin typeface="+mn-lt"/>
+          <a:ea typeface="+mn-ea"/>
+          <a:cs typeface="+mn-cs"/>
+        </a:defRPr>
+      </a:lvl4pPr>
+      <a:lvl5pPr marL="960120" algn="l" defTabSz="480060" rtl="0" eaLnBrk="1" latinLnBrk="0" hangingPunct="1">
+        <a:defRPr sz="945" kern="1200">
+          <a:solidFill>
+            <a:schemeClr val="tx1"/>
+          </a:solidFill>
+          <a:latin typeface="+mn-lt"/>
+          <a:ea typeface="+mn-ea"/>
+          <a:cs typeface="+mn-cs"/>
+        </a:defRPr>
+      </a:lvl5pPr>
+      <a:lvl6pPr marL="1200150" algn="l" defTabSz="480060" rtl="0" eaLnBrk="1" latinLnBrk="0" hangingPunct="1">
+        <a:defRPr sz="945" kern="1200">
+          <a:solidFill>
+            <a:schemeClr val="tx1"/>
+          </a:solidFill>
+          <a:latin typeface="+mn-lt"/>
+          <a:ea typeface="+mn-ea"/>
+          <a:cs typeface="+mn-cs"/>
+        </a:defRPr>
+      </a:lvl6pPr>
+      <a:lvl7pPr marL="1440180" algn="l" defTabSz="480060" rtl="0" eaLnBrk="1" latinLnBrk="0" hangingPunct="1">
+        <a:defRPr sz="945" kern="1200">
+          <a:solidFill>
+            <a:schemeClr val="tx1"/>
+          </a:solidFill>
+          <a:latin typeface="+mn-lt"/>
+          <a:ea typeface="+mn-ea"/>
+          <a:cs typeface="+mn-cs"/>
+        </a:defRPr>
+      </a:lvl7pPr>
+      <a:lvl8pPr marL="1680210" algn="l" defTabSz="480060" rtl="0" eaLnBrk="1" latinLnBrk="0" hangingPunct="1">
+        <a:defRPr sz="945" kern="1200">
+          <a:solidFill>
+            <a:schemeClr val="tx1"/>
+          </a:solidFill>
+          <a:latin typeface="+mn-lt"/>
+          <a:ea typeface="+mn-ea"/>
+          <a:cs typeface="+mn-cs"/>
+        </a:defRPr>
+      </a:lvl8pPr>
+      <a:lvl9pPr marL="1920240" algn="l" defTabSz="480060" rtl="0" eaLnBrk="1" latinLnBrk="0" hangingPunct="1">
+        <a:defRPr sz="945" kern="1200">
+          <a:solidFill>
+            <a:schemeClr val="tx1"/>
+          </a:solidFill>
+          <a:latin typeface="+mn-lt"/>
+          <a:ea typeface="+mn-ea"/>
+          <a:cs typeface="+mn-cs"/>
+        </a:defRPr>
+      </a:lvl9pPr>
+    </p:otherStyle>
+  </p:txStyles>
+</p:sldMaster>
+</file>
+
+<file path=ppt/slides/slide1.xml><?xml version="1.0" encoding="utf-8"?>
+<p:sld xmlns:a="http://schemas.openxmlformats.org/drawingml/2006/main" xmlns:r="http://schemas.openxmlformats.org/officeDocument/2006/relationships" xmlns:p="http://schemas.openxmlformats.org/presentationml/2006/main" show="0">
+  <p:cSld>
+    <p:spTree>
+      <p:nvGrpSpPr>
+        <p:cNvPr id="1" name=""/>
+        <p:cNvGrpSpPr/>
+        <p:nvPr/>
+      </p:nvGrpSpPr>
+      <p:grpSpPr>
+        <a:xfrm>
+          <a:off x="0" y="0"/>
+          <a:ext cx="0" cy="0"/>
+          <a:chOff x="0" y="0"/>
+          <a:chExt cx="0" cy="0"/>
+        </a:xfrm>
+      </p:grpSpPr>
+      <p:sp>
+        <p:nvSpPr>
           <p:cNvPr id="4" name="Textfeld 3">
             <a:extLst>
               <a:ext uri="{FF2B5EF4-FFF2-40B4-BE49-F238E27FC236}">
@@ -3436,8 +3437,8 @@
         </p:nvSpPr>
         <p:spPr>
           <a:xfrm>
-            <a:off x="900112" y="3050664"/>
-            <a:ext cx="3916518" cy="720197"/>
+            <a:off x="-5399882" y="-1449105"/>
+            <a:ext cx="3916518" cy="369332"/>
           </a:xfrm>
           <a:prstGeom prst="rect">
             <a:avLst/>
@@ -3484,7 +3485,7 @@
         </p:blipFill>
         <p:spPr>
           <a:xfrm>
-            <a:off x="1075763" y="6299994"/>
+            <a:off x="-4324912" y="1800225"/>
             <a:ext cx="7772400" cy="2178720"/>
           </a:xfrm>
           <a:prstGeom prst="rect">
@@ -3506,8 +3507,8 @@
         </p:nvSpPr>
         <p:spPr>
           <a:xfrm>
-            <a:off x="3072145" y="8580280"/>
-            <a:ext cx="3397875" cy="720197"/>
+            <a:off x="-2328530" y="4080511"/>
+            <a:ext cx="3397875" cy="369332"/>
           </a:xfrm>
           <a:prstGeom prst="rect">
             <a:avLst/>
@@ -3555,7 +3556,7 @@
         </p:blipFill>
         <p:spPr>
           <a:xfrm>
-            <a:off x="9060356" y="809237"/>
+            <a:off x="3659681" y="-3690532"/>
             <a:ext cx="7772400" cy="3242118"/>
           </a:xfrm>
           <a:prstGeom prst="rect">
@@ -3577,7 +3578,7 @@
         </p:nvSpPr>
         <p:spPr>
           <a:xfrm>
-            <a:off x="3980324" y="5784720"/>
+            <a:off x="-2319670" y="1284951"/>
             <a:ext cx="1963278" cy="523220"/>
           </a:xfrm>
           <a:prstGeom prst="rect">
@@ -3625,7 +3626,7 @@
         </p:nvSpPr>
         <p:spPr>
           <a:xfrm>
-            <a:off x="10857266" y="216923"/>
+            <a:off x="5456593" y="-4282846"/>
             <a:ext cx="4850943" cy="523220"/>
           </a:xfrm>
           <a:prstGeom prst="rect">
@@ -3684,7 +3685,7 @@
         </p:blipFill>
         <p:spPr>
           <a:xfrm>
-            <a:off x="900113" y="1620198"/>
+            <a:off x="-4500562" y="-2879571"/>
             <a:ext cx="7298191" cy="1376142"/>
           </a:xfrm>
           <a:prstGeom prst="rect">
@@ -3714,7 +3715,7 @@
         </p:blipFill>
         <p:spPr>
           <a:xfrm>
-            <a:off x="9304669" y="2905991"/>
+            <a:off x="3903994" y="-1593778"/>
             <a:ext cx="7772400" cy="1729740"/>
           </a:xfrm>
           <a:prstGeom prst="rect">
@@ -3736,8 +3737,8 @@
         </p:nvSpPr>
         <p:spPr>
           <a:xfrm>
-            <a:off x="3072145" y="4858578"/>
-            <a:ext cx="3476333" cy="720197"/>
+            <a:off x="-2328530" y="358809"/>
+            <a:ext cx="3476333" cy="369332"/>
           </a:xfrm>
           <a:prstGeom prst="rect">
             <a:avLst/>
@@ -3802,7 +3803,7 @@
         </p:blipFill>
         <p:spPr>
           <a:xfrm>
-            <a:off x="1227931" y="3494293"/>
+            <a:off x="-4172744" y="-1005476"/>
             <a:ext cx="7468064" cy="1280755"/>
           </a:xfrm>
           <a:prstGeom prst="rect">
@@ -3824,7 +3825,7 @@
         </p:nvSpPr>
         <p:spPr>
           <a:xfrm>
-            <a:off x="1681935" y="857381"/>
+            <a:off x="-3718740" y="-3642388"/>
             <a:ext cx="6178294" cy="523220"/>
           </a:xfrm>
           <a:prstGeom prst="rect">
@@ -3865,7 +3866,7 @@
         </p:nvSpPr>
         <p:spPr>
           <a:xfrm>
-            <a:off x="10802408" y="8362543"/>
+            <a:off x="5401735" y="3862774"/>
             <a:ext cx="5624367" cy="369332"/>
           </a:xfrm>
           <a:prstGeom prst="rect">
@@ -3931,7 +3932,7 @@
         </p:blipFill>
         <p:spPr>
           <a:xfrm>
-            <a:off x="10152116" y="4635731"/>
+            <a:off x="4751443" y="135962"/>
             <a:ext cx="6924953" cy="3726812"/>
           </a:xfrm>
           <a:prstGeom prst="rect">
@@ -3961,7 +3962,7 @@
         </p:blipFill>
         <p:spPr>
           <a:xfrm>
-            <a:off x="10433241" y="8989442"/>
+            <a:off x="5032566" y="4489673"/>
             <a:ext cx="6362700" cy="1536700"/>
           </a:xfrm>
           <a:prstGeom prst="rect">
@@ -3983,7 +3984,7 @@
         </p:nvSpPr>
         <p:spPr>
           <a:xfrm>
-            <a:off x="11418831" y="10783618"/>
+            <a:off x="6018158" y="6283849"/>
             <a:ext cx="4391519" cy="369332"/>
           </a:xfrm>
           <a:prstGeom prst="rect">
@@ -4049,7 +4050,7 @@
         </p:blipFill>
         <p:spPr>
           <a:xfrm>
-            <a:off x="1459377" y="10235588"/>
+            <a:off x="-3941298" y="5735820"/>
             <a:ext cx="8495315" cy="2178719"/>
           </a:xfrm>
           <a:prstGeom prst="rect">
@@ -4071,7 +4072,7 @@
         </p:nvSpPr>
         <p:spPr>
           <a:xfrm>
-            <a:off x="2895109" y="9712368"/>
+            <a:off x="-2505566" y="5212599"/>
             <a:ext cx="5623850" cy="523220"/>
           </a:xfrm>
           <a:prstGeom prst="rect">
@@ -4109,6 +4110,1731 @@
     <p:extLst>
       <p:ext uri="{BB962C8B-B14F-4D97-AF65-F5344CB8AC3E}">
         <p14:creationId xmlns:p14="http://schemas.microsoft.com/office/powerpoint/2010/main" val="3930249739"/>
+      </p:ext>
+    </p:extLst>
+  </p:cSld>
+  <p:clrMapOvr>
+    <a:masterClrMapping/>
+  </p:clrMapOvr>
+</p:sld>
+</file>
+
+<file path=ppt/slides/slide2.xml><?xml version="1.0" encoding="utf-8"?>
+<p:sld xmlns:a="http://schemas.openxmlformats.org/drawingml/2006/main" xmlns:r="http://schemas.openxmlformats.org/officeDocument/2006/relationships" xmlns:p="http://schemas.openxmlformats.org/presentationml/2006/main">
+  <p:cSld>
+    <p:spTree>
+      <p:nvGrpSpPr>
+        <p:cNvPr id="1" name=""/>
+        <p:cNvGrpSpPr/>
+        <p:nvPr/>
+      </p:nvGrpSpPr>
+      <p:grpSpPr>
+        <a:xfrm>
+          <a:off x="0" y="0"/>
+          <a:ext cx="0" cy="0"/>
+          <a:chOff x="0" y="0"/>
+          <a:chExt cx="0" cy="0"/>
+        </a:xfrm>
+      </p:grpSpPr>
+      <p:sp>
+        <p:nvSpPr>
+          <p:cNvPr id="5" name="Textfeld 4">
+            <a:extLst>
+              <a:ext uri="{FF2B5EF4-FFF2-40B4-BE49-F238E27FC236}">
+                <a16:creationId xmlns:a16="http://schemas.microsoft.com/office/drawing/2014/main" id="{B6DD29DD-6AE3-29F6-85DA-5513C3DEF5E6}"/>
+              </a:ext>
+            </a:extLst>
+          </p:cNvPr>
+          <p:cNvSpPr txBox="1"/>
+          <p:nvPr/>
+        </p:nvSpPr>
+        <p:spPr>
+          <a:xfrm>
+            <a:off x="306301" y="1061561"/>
+            <a:ext cx="6586710" cy="1477328"/>
+          </a:xfrm>
+          <a:prstGeom prst="rect">
+            <a:avLst/>
+          </a:prstGeom>
+          <a:noFill/>
+        </p:spPr>
+        <p:txBody>
+          <a:bodyPr wrap="square">
+            <a:spAutoFit/>
+          </a:bodyPr>
+          <a:lstStyle/>
+          <a:p>
+            <a:r>
+              <a:rPr lang="de-DE" dirty="0">
+                <a:solidFill>
+                  <a:srgbClr val="267326"/>
+                </a:solidFill>
+                <a:latin typeface="Arial" panose="020B0604020202020204" pitchFamily="34" charset="0"/>
+                <a:cs typeface="Arial" panose="020B0604020202020204" pitchFamily="34" charset="0"/>
+              </a:rPr>
+              <a:t>"Basierend auf den 55 Einzelstudien ergibt die Metaanalyse einen </a:t>
+            </a:r>
+            <a:r>
+              <a:rPr lang="de-DE" b="1" dirty="0">
+                <a:solidFill>
+                  <a:srgbClr val="267326"/>
+                </a:solidFill>
+                <a:highlight>
+                  <a:srgbClr val="8CD000"/>
+                </a:highlight>
+                <a:latin typeface="Arial" panose="020B0604020202020204" pitchFamily="34" charset="0"/>
+                <a:cs typeface="Arial" panose="020B0604020202020204" pitchFamily="34" charset="0"/>
+              </a:rPr>
+              <a:t>signifikanten positiven</a:t>
+            </a:r>
+            <a:r>
+              <a:rPr lang="de-DE" b="1" dirty="0">
+                <a:solidFill>
+                  <a:srgbClr val="267326"/>
+                </a:solidFill>
+                <a:latin typeface="Arial" panose="020B0604020202020204" pitchFamily="34" charset="0"/>
+                <a:cs typeface="Arial" panose="020B0604020202020204" pitchFamily="34" charset="0"/>
+              </a:rPr>
+              <a:t> </a:t>
+            </a:r>
+            <a:r>
+              <a:rPr lang="de-DE" dirty="0">
+                <a:solidFill>
+                  <a:srgbClr val="267326"/>
+                </a:solidFill>
+                <a:latin typeface="Arial" panose="020B0604020202020204" pitchFamily="34" charset="0"/>
+                <a:cs typeface="Arial" panose="020B0604020202020204" pitchFamily="34" charset="0"/>
+              </a:rPr>
+              <a:t>Gesamteffekt von Peer Assessment auf die Leistung: </a:t>
+            </a:r>
+            <a:r>
+              <a:rPr lang="de-DE" dirty="0" err="1">
+                <a:solidFill>
+                  <a:srgbClr val="267326"/>
+                </a:solidFill>
+                <a:latin typeface="Arial" panose="020B0604020202020204" pitchFamily="34" charset="0"/>
+                <a:cs typeface="Arial" panose="020B0604020202020204" pitchFamily="34" charset="0"/>
+              </a:rPr>
+              <a:t>g</a:t>
+            </a:r>
+            <a:r>
+              <a:rPr lang="de-DE" dirty="0">
+                <a:solidFill>
+                  <a:srgbClr val="267326"/>
+                </a:solidFill>
+                <a:latin typeface="Arial" panose="020B0604020202020204" pitchFamily="34" charset="0"/>
+                <a:cs typeface="Arial" panose="020B0604020202020204" pitchFamily="34" charset="0"/>
+              </a:rPr>
+              <a:t> = 0.31" </a:t>
+            </a:r>
+          </a:p>
+          <a:p>
+            <a:endParaRPr lang="de-DE" dirty="0">
+              <a:solidFill>
+                <a:srgbClr val="267326"/>
+              </a:solidFill>
+              <a:latin typeface="Arial" panose="020B0604020202020204" pitchFamily="34" charset="0"/>
+              <a:cs typeface="Arial" panose="020B0604020202020204" pitchFamily="34" charset="0"/>
+            </a:endParaRPr>
+          </a:p>
+          <a:p>
+            <a:r>
+              <a:rPr lang="de-DE" dirty="0">
+                <a:solidFill>
+                  <a:srgbClr val="267326"/>
+                </a:solidFill>
+                <a:latin typeface="Arial" panose="020B0604020202020204" pitchFamily="34" charset="0"/>
+                <a:cs typeface="Arial" panose="020B0604020202020204" pitchFamily="34" charset="0"/>
+              </a:rPr>
+              <a:t>(</a:t>
+            </a:r>
+            <a:r>
+              <a:rPr lang="de-DE" dirty="0" err="1">
+                <a:solidFill>
+                  <a:srgbClr val="267326"/>
+                </a:solidFill>
+                <a:latin typeface="Arial" panose="020B0604020202020204" pitchFamily="34" charset="0"/>
+                <a:cs typeface="Arial" panose="020B0604020202020204" pitchFamily="34" charset="0"/>
+              </a:rPr>
+              <a:t>Diery</a:t>
+            </a:r>
+            <a:r>
+              <a:rPr lang="de-DE" dirty="0">
+                <a:solidFill>
+                  <a:srgbClr val="267326"/>
+                </a:solidFill>
+                <a:latin typeface="Arial" panose="020B0604020202020204" pitchFamily="34" charset="0"/>
+                <a:cs typeface="Arial" panose="020B0604020202020204" pitchFamily="34" charset="0"/>
+              </a:rPr>
+              <a:t> et al., 2021, S.3, eigene Hervorhebungen)</a:t>
+            </a:r>
+          </a:p>
+        </p:txBody>
+      </p:sp>
+    </p:spTree>
+    <p:extLst>
+      <p:ext uri="{BB962C8B-B14F-4D97-AF65-F5344CB8AC3E}">
+        <p14:creationId xmlns:p14="http://schemas.microsoft.com/office/powerpoint/2010/main" val="322938083"/>
+      </p:ext>
+    </p:extLst>
+  </p:cSld>
+  <p:clrMapOvr>
+    <a:masterClrMapping/>
+  </p:clrMapOvr>
+</p:sld>
+</file>
+
+<file path=ppt/slides/slide3.xml><?xml version="1.0" encoding="utf-8"?>
+<p:sld xmlns:a="http://schemas.openxmlformats.org/drawingml/2006/main" xmlns:r="http://schemas.openxmlformats.org/officeDocument/2006/relationships" xmlns:p="http://schemas.openxmlformats.org/presentationml/2006/main">
+  <p:cSld>
+    <p:spTree>
+      <p:nvGrpSpPr>
+        <p:cNvPr id="1" name=""/>
+        <p:cNvGrpSpPr/>
+        <p:nvPr/>
+      </p:nvGrpSpPr>
+      <p:grpSpPr>
+        <a:xfrm>
+          <a:off x="0" y="0"/>
+          <a:ext cx="0" cy="0"/>
+          <a:chOff x="0" y="0"/>
+          <a:chExt cx="0" cy="0"/>
+        </a:xfrm>
+      </p:grpSpPr>
+      <p:sp>
+        <p:nvSpPr>
+          <p:cNvPr id="5" name="Textfeld 4">
+            <a:extLst>
+              <a:ext uri="{FF2B5EF4-FFF2-40B4-BE49-F238E27FC236}">
+                <a16:creationId xmlns:a16="http://schemas.microsoft.com/office/drawing/2014/main" id="{27539810-ADA6-3338-2D8A-9EB3C551F04C}"/>
+              </a:ext>
+            </a:extLst>
+          </p:cNvPr>
+          <p:cNvSpPr txBox="1"/>
+          <p:nvPr/>
+        </p:nvSpPr>
+        <p:spPr>
+          <a:xfrm>
+            <a:off x="311885" y="507563"/>
+            <a:ext cx="6575541" cy="2585323"/>
+          </a:xfrm>
+          <a:prstGeom prst="rect">
+            <a:avLst/>
+          </a:prstGeom>
+          <a:noFill/>
+        </p:spPr>
+        <p:txBody>
+          <a:bodyPr wrap="square">
+            <a:spAutoFit/>
+          </a:bodyPr>
+          <a:lstStyle/>
+          <a:p>
+            <a:r>
+              <a:rPr lang="de-DE" dirty="0">
+                <a:solidFill>
+                  <a:srgbClr val="267326"/>
+                </a:solidFill>
+                <a:latin typeface="Arial" panose="020B0604020202020204" pitchFamily="34" charset="0"/>
+                <a:cs typeface="Arial" panose="020B0604020202020204" pitchFamily="34" charset="0"/>
+              </a:rPr>
+              <a:t>"Die durchschnittlichen Effektstärken liegen nach der üblichen Einteilung nach Cohen (1988) im mittleren Bereich für die Wiedergabe von Wissen </a:t>
+            </a:r>
+            <a:r>
+              <a:rPr lang="de-DE" b="1" dirty="0">
+                <a:solidFill>
+                  <a:srgbClr val="267326"/>
+                </a:solidFill>
+                <a:highlight>
+                  <a:srgbClr val="8CD000"/>
+                </a:highlight>
+                <a:latin typeface="Arial" panose="020B0604020202020204" pitchFamily="34" charset="0"/>
+                <a:cs typeface="Arial" panose="020B0604020202020204" pitchFamily="34" charset="0"/>
+              </a:rPr>
+              <a:t>(</a:t>
+            </a:r>
+            <a:r>
+              <a:rPr lang="de-DE" b="1" i="1" dirty="0" err="1">
+                <a:solidFill>
+                  <a:srgbClr val="267326"/>
+                </a:solidFill>
+                <a:highlight>
+                  <a:srgbClr val="8CD000"/>
+                </a:highlight>
+                <a:latin typeface="Arial" panose="020B0604020202020204" pitchFamily="34" charset="0"/>
+                <a:cs typeface="Arial" panose="020B0604020202020204" pitchFamily="34" charset="0"/>
+              </a:rPr>
+              <a:t>g</a:t>
+            </a:r>
+            <a:r>
+              <a:rPr lang="de-DE" b="1" dirty="0">
+                <a:solidFill>
+                  <a:srgbClr val="267326"/>
+                </a:solidFill>
+                <a:highlight>
+                  <a:srgbClr val="8CD000"/>
+                </a:highlight>
+                <a:latin typeface="Arial" panose="020B0604020202020204" pitchFamily="34" charset="0"/>
+                <a:cs typeface="Arial" panose="020B0604020202020204" pitchFamily="34" charset="0"/>
+              </a:rPr>
+              <a:t> = 0.53) </a:t>
+            </a:r>
+            <a:r>
+              <a:rPr lang="de-DE" dirty="0">
+                <a:solidFill>
+                  <a:srgbClr val="267326"/>
+                </a:solidFill>
+                <a:latin typeface="Arial" panose="020B0604020202020204" pitchFamily="34" charset="0"/>
+                <a:cs typeface="Arial" panose="020B0604020202020204" pitchFamily="34" charset="0"/>
+              </a:rPr>
+              <a:t>(...). Die Größe dieser Effekte bedeuten, dass </a:t>
+            </a:r>
+            <a:r>
+              <a:rPr lang="de-DE" b="1" dirty="0">
+                <a:solidFill>
+                  <a:srgbClr val="267326"/>
+                </a:solidFill>
+                <a:highlight>
+                  <a:srgbClr val="8CD000"/>
+                </a:highlight>
+                <a:latin typeface="Arial" panose="020B0604020202020204" pitchFamily="34" charset="0"/>
+                <a:cs typeface="Arial" panose="020B0604020202020204" pitchFamily="34" charset="0"/>
+              </a:rPr>
+              <a:t>ca. 70 % der SchülerInnen, die mit Lernmaterialien mit Hervorhebungen gearbeitet haben, Lerninhalte besser wiedergeben (...) als der Durchschnitt der Kontrollgruppe</a:t>
+            </a:r>
+            <a:r>
+              <a:rPr lang="de-DE" dirty="0">
+                <a:solidFill>
+                  <a:srgbClr val="267326"/>
+                </a:solidFill>
+                <a:latin typeface="Arial" panose="020B0604020202020204" pitchFamily="34" charset="0"/>
+                <a:cs typeface="Arial" panose="020B0604020202020204" pitchFamily="34" charset="0"/>
+              </a:rPr>
+              <a:t>" </a:t>
+            </a:r>
+          </a:p>
+          <a:p>
+            <a:endParaRPr lang="de-DE" dirty="0">
+              <a:solidFill>
+                <a:srgbClr val="267326"/>
+              </a:solidFill>
+              <a:latin typeface="Arial" panose="020B0604020202020204" pitchFamily="34" charset="0"/>
+              <a:cs typeface="Arial" panose="020B0604020202020204" pitchFamily="34" charset="0"/>
+            </a:endParaRPr>
+          </a:p>
+          <a:p>
+            <a:r>
+              <a:rPr lang="de-DE" dirty="0">
+                <a:solidFill>
+                  <a:srgbClr val="267326"/>
+                </a:solidFill>
+                <a:latin typeface="Arial" panose="020B0604020202020204" pitchFamily="34" charset="0"/>
+                <a:cs typeface="Arial" panose="020B0604020202020204" pitchFamily="34" charset="0"/>
+              </a:rPr>
+              <a:t>(Wiesbeck et al., 2018, S.5, eigene Hervorhebungen)</a:t>
+            </a:r>
+          </a:p>
+        </p:txBody>
+      </p:sp>
+    </p:spTree>
+    <p:extLst>
+      <p:ext uri="{BB962C8B-B14F-4D97-AF65-F5344CB8AC3E}">
+        <p14:creationId xmlns:p14="http://schemas.microsoft.com/office/powerpoint/2010/main" val="999521230"/>
+      </p:ext>
+    </p:extLst>
+  </p:cSld>
+  <p:clrMapOvr>
+    <a:masterClrMapping/>
+  </p:clrMapOvr>
+</p:sld>
+</file>
+
+<file path=ppt/slides/slide4.xml><?xml version="1.0" encoding="utf-8"?>
+<p:sld xmlns:a="http://schemas.openxmlformats.org/drawingml/2006/main" xmlns:r="http://schemas.openxmlformats.org/officeDocument/2006/relationships" xmlns:p="http://schemas.openxmlformats.org/presentationml/2006/main">
+  <p:cSld>
+    <p:spTree>
+      <p:nvGrpSpPr>
+        <p:cNvPr id="1" name=""/>
+        <p:cNvGrpSpPr/>
+        <p:nvPr/>
+      </p:nvGrpSpPr>
+      <p:grpSpPr>
+        <a:xfrm>
+          <a:off x="0" y="0"/>
+          <a:ext cx="0" cy="0"/>
+          <a:chOff x="0" y="0"/>
+          <a:chExt cx="0" cy="0"/>
+        </a:xfrm>
+      </p:grpSpPr>
+      <p:sp>
+        <p:nvSpPr>
+          <p:cNvPr id="5" name="Textfeld 4">
+            <a:extLst>
+              <a:ext uri="{FF2B5EF4-FFF2-40B4-BE49-F238E27FC236}">
+                <a16:creationId xmlns:a16="http://schemas.microsoft.com/office/drawing/2014/main" id="{91613DE5-1F12-E9C5-1C21-27240D1B392C}"/>
+              </a:ext>
+            </a:extLst>
+          </p:cNvPr>
+          <p:cNvSpPr txBox="1"/>
+          <p:nvPr/>
+        </p:nvSpPr>
+        <p:spPr>
+          <a:xfrm>
+            <a:off x="22658" y="1061561"/>
+            <a:ext cx="7176655" cy="1477328"/>
+          </a:xfrm>
+          <a:prstGeom prst="rect">
+            <a:avLst/>
+          </a:prstGeom>
+          <a:noFill/>
+        </p:spPr>
+        <p:txBody>
+          <a:bodyPr wrap="square">
+            <a:spAutoFit/>
+          </a:bodyPr>
+          <a:lstStyle/>
+          <a:p>
+            <a:r>
+              <a:rPr lang="de-DE" dirty="0">
+                <a:solidFill>
+                  <a:srgbClr val="267326"/>
+                </a:solidFill>
+                <a:latin typeface="Arial" panose="020B0604020202020204" pitchFamily="34" charset="0"/>
+                <a:cs typeface="Arial" panose="020B0604020202020204" pitchFamily="34" charset="0"/>
+              </a:rPr>
+              <a:t>"The </a:t>
+            </a:r>
+            <a:r>
+              <a:rPr lang="de-DE" dirty="0" err="1">
+                <a:solidFill>
+                  <a:srgbClr val="267326"/>
+                </a:solidFill>
+                <a:latin typeface="Arial" panose="020B0604020202020204" pitchFamily="34" charset="0"/>
+                <a:cs typeface="Arial" panose="020B0604020202020204" pitchFamily="34" charset="0"/>
+              </a:rPr>
+              <a:t>average</a:t>
+            </a:r>
+            <a:r>
+              <a:rPr lang="de-DE" dirty="0">
+                <a:solidFill>
+                  <a:srgbClr val="267326"/>
+                </a:solidFill>
+                <a:latin typeface="Arial" panose="020B0604020202020204" pitchFamily="34" charset="0"/>
+                <a:cs typeface="Arial" panose="020B0604020202020204" pitchFamily="34" charset="0"/>
+              </a:rPr>
+              <a:t> </a:t>
+            </a:r>
+            <a:r>
+              <a:rPr lang="de-DE" dirty="0" err="1">
+                <a:solidFill>
+                  <a:srgbClr val="267326"/>
+                </a:solidFill>
+                <a:latin typeface="Arial" panose="020B0604020202020204" pitchFamily="34" charset="0"/>
+                <a:cs typeface="Arial" panose="020B0604020202020204" pitchFamily="34" charset="0"/>
+              </a:rPr>
+              <a:t>impact</a:t>
+            </a:r>
+            <a:r>
+              <a:rPr lang="de-DE" dirty="0">
+                <a:solidFill>
+                  <a:srgbClr val="267326"/>
+                </a:solidFill>
+                <a:latin typeface="Arial" panose="020B0604020202020204" pitchFamily="34" charset="0"/>
+                <a:cs typeface="Arial" panose="020B0604020202020204" pitchFamily="34" charset="0"/>
+              </a:rPr>
+              <a:t> </a:t>
+            </a:r>
+            <a:r>
+              <a:rPr lang="de-DE" dirty="0" err="1">
+                <a:solidFill>
+                  <a:srgbClr val="267326"/>
+                </a:solidFill>
+                <a:latin typeface="Arial" panose="020B0604020202020204" pitchFamily="34" charset="0"/>
+                <a:cs typeface="Arial" panose="020B0604020202020204" pitchFamily="34" charset="0"/>
+              </a:rPr>
+              <a:t>of</a:t>
+            </a:r>
+            <a:r>
+              <a:rPr lang="de-DE" dirty="0">
+                <a:solidFill>
+                  <a:srgbClr val="267326"/>
+                </a:solidFill>
+                <a:latin typeface="Arial" panose="020B0604020202020204" pitchFamily="34" charset="0"/>
+                <a:cs typeface="Arial" panose="020B0604020202020204" pitchFamily="34" charset="0"/>
+              </a:rPr>
+              <a:t> </a:t>
+            </a:r>
+            <a:r>
+              <a:rPr lang="de-DE" dirty="0" err="1">
+                <a:solidFill>
+                  <a:srgbClr val="267326"/>
+                </a:solidFill>
+                <a:latin typeface="Arial" panose="020B0604020202020204" pitchFamily="34" charset="0"/>
+                <a:cs typeface="Arial" panose="020B0604020202020204" pitchFamily="34" charset="0"/>
+              </a:rPr>
+              <a:t>metacognition</a:t>
+            </a:r>
+            <a:r>
+              <a:rPr lang="de-DE" dirty="0">
+                <a:solidFill>
+                  <a:srgbClr val="267326"/>
+                </a:solidFill>
+                <a:latin typeface="Arial" panose="020B0604020202020204" pitchFamily="34" charset="0"/>
+                <a:cs typeface="Arial" panose="020B0604020202020204" pitchFamily="34" charset="0"/>
+              </a:rPr>
+              <a:t> and </a:t>
+            </a:r>
+            <a:r>
+              <a:rPr lang="de-DE" dirty="0" err="1">
+                <a:solidFill>
+                  <a:srgbClr val="267326"/>
+                </a:solidFill>
+                <a:latin typeface="Arial" panose="020B0604020202020204" pitchFamily="34" charset="0"/>
+                <a:cs typeface="Arial" panose="020B0604020202020204" pitchFamily="34" charset="0"/>
+              </a:rPr>
+              <a:t>self</a:t>
+            </a:r>
+            <a:r>
+              <a:rPr lang="de-DE" dirty="0">
+                <a:solidFill>
+                  <a:srgbClr val="267326"/>
+                </a:solidFill>
+                <a:latin typeface="Arial" panose="020B0604020202020204" pitchFamily="34" charset="0"/>
+                <a:cs typeface="Arial" panose="020B0604020202020204" pitchFamily="34" charset="0"/>
+              </a:rPr>
+              <a:t>-regulation </a:t>
+            </a:r>
+            <a:r>
+              <a:rPr lang="de-DE" dirty="0" err="1">
+                <a:solidFill>
+                  <a:srgbClr val="267326"/>
+                </a:solidFill>
+                <a:latin typeface="Arial" panose="020B0604020202020204" pitchFamily="34" charset="0"/>
+                <a:cs typeface="Arial" panose="020B0604020202020204" pitchFamily="34" charset="0"/>
+              </a:rPr>
+              <a:t>strategies</a:t>
+            </a:r>
+            <a:r>
+              <a:rPr lang="de-DE" dirty="0">
+                <a:solidFill>
+                  <a:srgbClr val="267326"/>
+                </a:solidFill>
+                <a:latin typeface="Arial" panose="020B0604020202020204" pitchFamily="34" charset="0"/>
+                <a:cs typeface="Arial" panose="020B0604020202020204" pitchFamily="34" charset="0"/>
+              </a:rPr>
+              <a:t> (on </a:t>
+            </a:r>
+            <a:r>
+              <a:rPr lang="de-DE" dirty="0" err="1">
+                <a:solidFill>
+                  <a:srgbClr val="267326"/>
+                </a:solidFill>
+                <a:latin typeface="Arial" panose="020B0604020202020204" pitchFamily="34" charset="0"/>
+                <a:cs typeface="Arial" panose="020B0604020202020204" pitchFamily="34" charset="0"/>
+              </a:rPr>
+              <a:t>learning</a:t>
+            </a:r>
+            <a:r>
+              <a:rPr lang="de-DE" dirty="0">
+                <a:solidFill>
+                  <a:srgbClr val="267326"/>
+                </a:solidFill>
+                <a:latin typeface="Arial" panose="020B0604020202020204" pitchFamily="34" charset="0"/>
+                <a:cs typeface="Arial" panose="020B0604020202020204" pitchFamily="34" charset="0"/>
+              </a:rPr>
+              <a:t>) </a:t>
+            </a:r>
+            <a:r>
+              <a:rPr lang="de-DE" dirty="0" err="1">
+                <a:solidFill>
+                  <a:srgbClr val="267326"/>
+                </a:solidFill>
+                <a:latin typeface="Arial" panose="020B0604020202020204" pitchFamily="34" charset="0"/>
+                <a:cs typeface="Arial" panose="020B0604020202020204" pitchFamily="34" charset="0"/>
+              </a:rPr>
+              <a:t>is</a:t>
+            </a:r>
+            <a:r>
+              <a:rPr lang="de-DE" dirty="0">
+                <a:solidFill>
+                  <a:srgbClr val="267326"/>
+                </a:solidFill>
+                <a:latin typeface="Arial" panose="020B0604020202020204" pitchFamily="34" charset="0"/>
+                <a:cs typeface="Arial" panose="020B0604020202020204" pitchFamily="34" charset="0"/>
+              </a:rPr>
+              <a:t> an </a:t>
+            </a:r>
+            <a:r>
+              <a:rPr lang="de-DE" b="1" dirty="0">
+                <a:solidFill>
+                  <a:srgbClr val="267326"/>
+                </a:solidFill>
+                <a:highlight>
+                  <a:srgbClr val="8CD000"/>
+                </a:highlight>
+                <a:latin typeface="Arial" panose="020B0604020202020204" pitchFamily="34" charset="0"/>
+                <a:cs typeface="Arial" panose="020B0604020202020204" pitchFamily="34" charset="0"/>
+              </a:rPr>
+              <a:t>additional </a:t>
+            </a:r>
+            <a:r>
+              <a:rPr lang="de-DE" b="1" dirty="0" err="1">
+                <a:solidFill>
+                  <a:srgbClr val="267326"/>
+                </a:solidFill>
+                <a:highlight>
+                  <a:srgbClr val="8CD000"/>
+                </a:highlight>
+                <a:latin typeface="Arial" panose="020B0604020202020204" pitchFamily="34" charset="0"/>
+                <a:cs typeface="Arial" panose="020B0604020202020204" pitchFamily="34" charset="0"/>
+              </a:rPr>
+              <a:t>seven</a:t>
+            </a:r>
+            <a:r>
+              <a:rPr lang="de-DE" b="1" dirty="0">
+                <a:solidFill>
+                  <a:srgbClr val="267326"/>
+                </a:solidFill>
+                <a:highlight>
+                  <a:srgbClr val="8CD000"/>
+                </a:highlight>
+                <a:latin typeface="Arial" panose="020B0604020202020204" pitchFamily="34" charset="0"/>
+                <a:cs typeface="Arial" panose="020B0604020202020204" pitchFamily="34" charset="0"/>
+              </a:rPr>
+              <a:t> </a:t>
+            </a:r>
+            <a:r>
+              <a:rPr lang="de-DE" b="1" dirty="0" err="1">
+                <a:solidFill>
+                  <a:srgbClr val="267326"/>
+                </a:solidFill>
+                <a:highlight>
+                  <a:srgbClr val="8CD000"/>
+                </a:highlight>
+                <a:latin typeface="Arial" panose="020B0604020202020204" pitchFamily="34" charset="0"/>
+                <a:cs typeface="Arial" panose="020B0604020202020204" pitchFamily="34" charset="0"/>
+              </a:rPr>
+              <a:t>month's</a:t>
+            </a:r>
+            <a:r>
+              <a:rPr lang="de-DE" b="1" dirty="0">
+                <a:solidFill>
+                  <a:srgbClr val="267326"/>
+                </a:solidFill>
+                <a:highlight>
+                  <a:srgbClr val="8CD000"/>
+                </a:highlight>
+                <a:latin typeface="Arial" panose="020B0604020202020204" pitchFamily="34" charset="0"/>
+                <a:cs typeface="Arial" panose="020B0604020202020204" pitchFamily="34" charset="0"/>
+              </a:rPr>
+              <a:t> </a:t>
+            </a:r>
+            <a:r>
+              <a:rPr lang="de-DE" b="1" dirty="0" err="1">
+                <a:solidFill>
+                  <a:srgbClr val="267326"/>
+                </a:solidFill>
+                <a:highlight>
+                  <a:srgbClr val="8CD000"/>
+                </a:highlight>
+                <a:latin typeface="Arial" panose="020B0604020202020204" pitchFamily="34" charset="0"/>
+                <a:cs typeface="Arial" panose="020B0604020202020204" pitchFamily="34" charset="0"/>
+              </a:rPr>
+              <a:t>progress</a:t>
+            </a:r>
+            <a:r>
+              <a:rPr lang="de-DE" b="1" dirty="0">
+                <a:solidFill>
+                  <a:srgbClr val="267326"/>
+                </a:solidFill>
+                <a:highlight>
+                  <a:srgbClr val="8CD000"/>
+                </a:highlight>
+                <a:latin typeface="Arial" panose="020B0604020202020204" pitchFamily="34" charset="0"/>
+                <a:cs typeface="Arial" panose="020B0604020202020204" pitchFamily="34" charset="0"/>
+              </a:rPr>
+              <a:t> </a:t>
+            </a:r>
+            <a:r>
+              <a:rPr lang="de-DE" b="1" dirty="0" err="1">
+                <a:solidFill>
+                  <a:srgbClr val="267326"/>
+                </a:solidFill>
+                <a:highlight>
+                  <a:srgbClr val="8CD000"/>
+                </a:highlight>
+                <a:latin typeface="Arial" panose="020B0604020202020204" pitchFamily="34" charset="0"/>
+                <a:cs typeface="Arial" panose="020B0604020202020204" pitchFamily="34" charset="0"/>
+              </a:rPr>
+              <a:t>over</a:t>
+            </a:r>
+            <a:r>
+              <a:rPr lang="de-DE" b="1" dirty="0">
+                <a:solidFill>
+                  <a:srgbClr val="267326"/>
+                </a:solidFill>
+                <a:highlight>
+                  <a:srgbClr val="8CD000"/>
+                </a:highlight>
+                <a:latin typeface="Arial" panose="020B0604020202020204" pitchFamily="34" charset="0"/>
+                <a:cs typeface="Arial" panose="020B0604020202020204" pitchFamily="34" charset="0"/>
+              </a:rPr>
+              <a:t> </a:t>
+            </a:r>
+            <a:r>
+              <a:rPr lang="de-DE" b="1" dirty="0" err="1">
+                <a:solidFill>
+                  <a:srgbClr val="267326"/>
+                </a:solidFill>
+                <a:highlight>
+                  <a:srgbClr val="8CD000"/>
+                </a:highlight>
+                <a:latin typeface="Arial" panose="020B0604020202020204" pitchFamily="34" charset="0"/>
+                <a:cs typeface="Arial" panose="020B0604020202020204" pitchFamily="34" charset="0"/>
+              </a:rPr>
+              <a:t>the</a:t>
+            </a:r>
+            <a:r>
+              <a:rPr lang="de-DE" b="1" dirty="0">
+                <a:solidFill>
+                  <a:srgbClr val="267326"/>
+                </a:solidFill>
+                <a:highlight>
+                  <a:srgbClr val="8CD000"/>
+                </a:highlight>
+                <a:latin typeface="Arial" panose="020B0604020202020204" pitchFamily="34" charset="0"/>
+                <a:cs typeface="Arial" panose="020B0604020202020204" pitchFamily="34" charset="0"/>
+              </a:rPr>
+              <a:t> </a:t>
+            </a:r>
+            <a:r>
+              <a:rPr lang="de-DE" b="1" dirty="0" err="1">
+                <a:solidFill>
+                  <a:srgbClr val="267326"/>
+                </a:solidFill>
+                <a:highlight>
+                  <a:srgbClr val="8CD000"/>
+                </a:highlight>
+                <a:latin typeface="Arial" panose="020B0604020202020204" pitchFamily="34" charset="0"/>
+                <a:cs typeface="Arial" panose="020B0604020202020204" pitchFamily="34" charset="0"/>
+              </a:rPr>
+              <a:t>course</a:t>
+            </a:r>
+            <a:r>
+              <a:rPr lang="de-DE" b="1" dirty="0">
+                <a:solidFill>
+                  <a:srgbClr val="267326"/>
+                </a:solidFill>
+                <a:highlight>
+                  <a:srgbClr val="8CD000"/>
+                </a:highlight>
+                <a:latin typeface="Arial" panose="020B0604020202020204" pitchFamily="34" charset="0"/>
+                <a:cs typeface="Arial" panose="020B0604020202020204" pitchFamily="34" charset="0"/>
+              </a:rPr>
+              <a:t> </a:t>
+            </a:r>
+            <a:r>
+              <a:rPr lang="de-DE" b="1" dirty="0" err="1">
+                <a:solidFill>
+                  <a:srgbClr val="267326"/>
+                </a:solidFill>
+                <a:highlight>
+                  <a:srgbClr val="8CD000"/>
+                </a:highlight>
+                <a:latin typeface="Arial" panose="020B0604020202020204" pitchFamily="34" charset="0"/>
+                <a:cs typeface="Arial" panose="020B0604020202020204" pitchFamily="34" charset="0"/>
+              </a:rPr>
+              <a:t>of</a:t>
+            </a:r>
+            <a:r>
+              <a:rPr lang="de-DE" b="1" dirty="0">
+                <a:solidFill>
+                  <a:srgbClr val="267326"/>
+                </a:solidFill>
+                <a:highlight>
+                  <a:srgbClr val="8CD000"/>
+                </a:highlight>
+                <a:latin typeface="Arial" panose="020B0604020202020204" pitchFamily="34" charset="0"/>
+                <a:cs typeface="Arial" panose="020B0604020202020204" pitchFamily="34" charset="0"/>
+              </a:rPr>
+              <a:t> a </a:t>
+            </a:r>
+            <a:r>
+              <a:rPr lang="de-DE" b="1" dirty="0" err="1">
+                <a:solidFill>
+                  <a:srgbClr val="267326"/>
+                </a:solidFill>
+                <a:highlight>
+                  <a:srgbClr val="8CD000"/>
+                </a:highlight>
+                <a:latin typeface="Arial" panose="020B0604020202020204" pitchFamily="34" charset="0"/>
+                <a:cs typeface="Arial" panose="020B0604020202020204" pitchFamily="34" charset="0"/>
+              </a:rPr>
+              <a:t>year</a:t>
+            </a:r>
+            <a:r>
+              <a:rPr lang="de-DE" dirty="0">
+                <a:solidFill>
+                  <a:srgbClr val="267326"/>
+                </a:solidFill>
+                <a:latin typeface="Arial" panose="020B0604020202020204" pitchFamily="34" charset="0"/>
+                <a:cs typeface="Arial" panose="020B0604020202020204" pitchFamily="34" charset="0"/>
+              </a:rPr>
+              <a:t>" </a:t>
+            </a:r>
+          </a:p>
+          <a:p>
+            <a:endParaRPr lang="de-DE" dirty="0">
+              <a:solidFill>
+                <a:srgbClr val="267326"/>
+              </a:solidFill>
+              <a:latin typeface="Arial" panose="020B0604020202020204" pitchFamily="34" charset="0"/>
+              <a:cs typeface="Arial" panose="020B0604020202020204" pitchFamily="34" charset="0"/>
+            </a:endParaRPr>
+          </a:p>
+          <a:p>
+            <a:r>
+              <a:rPr lang="de-DE" dirty="0">
+                <a:solidFill>
+                  <a:srgbClr val="267326"/>
+                </a:solidFill>
+                <a:latin typeface="Arial" panose="020B0604020202020204" pitchFamily="34" charset="0"/>
+                <a:cs typeface="Arial" panose="020B0604020202020204" pitchFamily="34" charset="0"/>
+              </a:rPr>
+              <a:t>(Education Endowment </a:t>
+            </a:r>
+            <a:r>
+              <a:rPr lang="de-DE" dirty="0" err="1">
+                <a:solidFill>
+                  <a:srgbClr val="267326"/>
+                </a:solidFill>
+                <a:latin typeface="Arial" panose="020B0604020202020204" pitchFamily="34" charset="0"/>
+                <a:cs typeface="Arial" panose="020B0604020202020204" pitchFamily="34" charset="0"/>
+              </a:rPr>
+              <a:t>Foundation</a:t>
+            </a:r>
+            <a:r>
+              <a:rPr lang="de-DE" dirty="0">
+                <a:solidFill>
+                  <a:srgbClr val="267326"/>
+                </a:solidFill>
+                <a:latin typeface="Arial" panose="020B0604020202020204" pitchFamily="34" charset="0"/>
+                <a:cs typeface="Arial" panose="020B0604020202020204" pitchFamily="34" charset="0"/>
+              </a:rPr>
+              <a:t>, 2021, eigene Hervorhebungen)</a:t>
+            </a:r>
+          </a:p>
+        </p:txBody>
+      </p:sp>
+    </p:spTree>
+    <p:extLst>
+      <p:ext uri="{BB962C8B-B14F-4D97-AF65-F5344CB8AC3E}">
+        <p14:creationId xmlns:p14="http://schemas.microsoft.com/office/powerpoint/2010/main" val="551710936"/>
+      </p:ext>
+    </p:extLst>
+  </p:cSld>
+  <p:clrMapOvr>
+    <a:masterClrMapping/>
+  </p:clrMapOvr>
+</p:sld>
+</file>
+
+<file path=ppt/slides/slide5.xml><?xml version="1.0" encoding="utf-8"?>
+<p:sld xmlns:a="http://schemas.openxmlformats.org/drawingml/2006/main" xmlns:r="http://schemas.openxmlformats.org/officeDocument/2006/relationships" xmlns:p="http://schemas.openxmlformats.org/presentationml/2006/main">
+  <p:cSld>
+    <p:spTree>
+      <p:nvGrpSpPr>
+        <p:cNvPr id="1" name=""/>
+        <p:cNvGrpSpPr/>
+        <p:nvPr/>
+      </p:nvGrpSpPr>
+      <p:grpSpPr>
+        <a:xfrm>
+          <a:off x="0" y="0"/>
+          <a:ext cx="0" cy="0"/>
+          <a:chOff x="0" y="0"/>
+          <a:chExt cx="0" cy="0"/>
+        </a:xfrm>
+      </p:grpSpPr>
+      <p:sp>
+        <p:nvSpPr>
+          <p:cNvPr id="5" name="Textfeld 4">
+            <a:extLst>
+              <a:ext uri="{FF2B5EF4-FFF2-40B4-BE49-F238E27FC236}">
+                <a16:creationId xmlns:a16="http://schemas.microsoft.com/office/drawing/2014/main" id="{BD3BE171-1A0C-13BC-5CBD-B2580B5E6B7D}"/>
+              </a:ext>
+            </a:extLst>
+          </p:cNvPr>
+          <p:cNvSpPr txBox="1"/>
+          <p:nvPr/>
+        </p:nvSpPr>
+        <p:spPr>
+          <a:xfrm>
+            <a:off x="307181" y="923062"/>
+            <a:ext cx="6584950" cy="1754326"/>
+          </a:xfrm>
+          <a:prstGeom prst="rect">
+            <a:avLst/>
+          </a:prstGeom>
+          <a:noFill/>
+        </p:spPr>
+        <p:txBody>
+          <a:bodyPr wrap="square">
+            <a:spAutoFit/>
+          </a:bodyPr>
+          <a:lstStyle/>
+          <a:p>
+            <a:r>
+              <a:rPr lang="de-DE" dirty="0">
+                <a:solidFill>
+                  <a:srgbClr val="267326"/>
+                </a:solidFill>
+                <a:latin typeface="Arial" panose="020B0604020202020204" pitchFamily="34" charset="0"/>
+                <a:cs typeface="Arial" panose="020B0604020202020204" pitchFamily="34" charset="0"/>
+              </a:rPr>
+              <a:t>„(…) an </a:t>
+            </a:r>
+            <a:r>
+              <a:rPr lang="de-DE" dirty="0" err="1">
+                <a:solidFill>
+                  <a:srgbClr val="267326"/>
+                </a:solidFill>
+                <a:latin typeface="Arial" panose="020B0604020202020204" pitchFamily="34" charset="0"/>
+                <a:cs typeface="Arial" panose="020B0604020202020204" pitchFamily="34" charset="0"/>
+              </a:rPr>
+              <a:t>improvement</a:t>
+            </a:r>
+            <a:r>
+              <a:rPr lang="de-DE" dirty="0">
+                <a:solidFill>
+                  <a:srgbClr val="267326"/>
+                </a:solidFill>
+                <a:latin typeface="Arial" panose="020B0604020202020204" pitchFamily="34" charset="0"/>
+                <a:cs typeface="Arial" panose="020B0604020202020204" pitchFamily="34" charset="0"/>
+              </a:rPr>
+              <a:t> </a:t>
+            </a:r>
+            <a:r>
+              <a:rPr lang="de-DE" b="1" dirty="0" err="1">
+                <a:solidFill>
+                  <a:srgbClr val="267326"/>
+                </a:solidFill>
+                <a:highlight>
+                  <a:srgbClr val="8CD000"/>
+                </a:highlight>
+                <a:latin typeface="Arial" panose="020B0604020202020204" pitchFamily="34" charset="0"/>
+                <a:cs typeface="Arial" panose="020B0604020202020204" pitchFamily="34" charset="0"/>
+              </a:rPr>
+              <a:t>index</a:t>
+            </a:r>
+            <a:r>
+              <a:rPr lang="de-DE" b="1" dirty="0">
+                <a:solidFill>
+                  <a:srgbClr val="267326"/>
+                </a:solidFill>
+                <a:highlight>
+                  <a:srgbClr val="8CD000"/>
+                </a:highlight>
+                <a:latin typeface="Arial" panose="020B0604020202020204" pitchFamily="34" charset="0"/>
+                <a:cs typeface="Arial" panose="020B0604020202020204" pitchFamily="34" charset="0"/>
+              </a:rPr>
+              <a:t> </a:t>
+            </a:r>
+            <a:r>
+              <a:rPr lang="de-DE" b="1" dirty="0" err="1">
+                <a:solidFill>
+                  <a:srgbClr val="267326"/>
+                </a:solidFill>
+                <a:highlight>
+                  <a:srgbClr val="8CD000"/>
+                </a:highlight>
+                <a:latin typeface="Arial" panose="020B0604020202020204" pitchFamily="34" charset="0"/>
+                <a:cs typeface="Arial" panose="020B0604020202020204" pitchFamily="34" charset="0"/>
+              </a:rPr>
+              <a:t>of</a:t>
+            </a:r>
+            <a:r>
+              <a:rPr lang="de-DE" b="1" dirty="0">
+                <a:solidFill>
+                  <a:srgbClr val="267326"/>
+                </a:solidFill>
+                <a:highlight>
+                  <a:srgbClr val="8CD000"/>
+                </a:highlight>
+                <a:latin typeface="Arial" panose="020B0604020202020204" pitchFamily="34" charset="0"/>
+                <a:cs typeface="Arial" panose="020B0604020202020204" pitchFamily="34" charset="0"/>
+              </a:rPr>
+              <a:t> +13</a:t>
+            </a:r>
+            <a:r>
+              <a:rPr lang="de-DE" b="1" dirty="0">
+                <a:solidFill>
+                  <a:srgbClr val="267326"/>
+                </a:solidFill>
+                <a:latin typeface="Arial" panose="020B0604020202020204" pitchFamily="34" charset="0"/>
+                <a:cs typeface="Arial" panose="020B0604020202020204" pitchFamily="34" charset="0"/>
+              </a:rPr>
+              <a:t> </a:t>
+            </a:r>
+            <a:r>
+              <a:rPr lang="de-DE" dirty="0" err="1">
+                <a:solidFill>
+                  <a:srgbClr val="267326"/>
+                </a:solidFill>
+                <a:latin typeface="Arial" panose="020B0604020202020204" pitchFamily="34" charset="0"/>
+                <a:cs typeface="Arial" panose="020B0604020202020204" pitchFamily="34" charset="0"/>
+              </a:rPr>
+              <a:t>means</a:t>
+            </a:r>
+            <a:r>
+              <a:rPr lang="de-DE" dirty="0">
+                <a:solidFill>
+                  <a:srgbClr val="267326"/>
+                </a:solidFill>
+                <a:latin typeface="Arial" panose="020B0604020202020204" pitchFamily="34" charset="0"/>
+                <a:cs typeface="Arial" panose="020B0604020202020204" pitchFamily="34" charset="0"/>
+              </a:rPr>
+              <a:t> </a:t>
+            </a:r>
+            <a:r>
+              <a:rPr lang="de-DE" dirty="0" err="1">
+                <a:solidFill>
+                  <a:srgbClr val="267326"/>
+                </a:solidFill>
+                <a:latin typeface="Arial" panose="020B0604020202020204" pitchFamily="34" charset="0"/>
+                <a:cs typeface="Arial" panose="020B0604020202020204" pitchFamily="34" charset="0"/>
+              </a:rPr>
+              <a:t>that</a:t>
+            </a:r>
+            <a:r>
+              <a:rPr lang="de-DE" dirty="0">
+                <a:solidFill>
+                  <a:srgbClr val="267326"/>
+                </a:solidFill>
+                <a:latin typeface="Arial" panose="020B0604020202020204" pitchFamily="34" charset="0"/>
+                <a:cs typeface="Arial" panose="020B0604020202020204" pitchFamily="34" charset="0"/>
+              </a:rPr>
+              <a:t> </a:t>
+            </a:r>
+            <a:r>
+              <a:rPr lang="de-DE" dirty="0" err="1">
+                <a:solidFill>
+                  <a:srgbClr val="267326"/>
+                </a:solidFill>
+                <a:latin typeface="Arial" panose="020B0604020202020204" pitchFamily="34" charset="0"/>
+                <a:cs typeface="Arial" panose="020B0604020202020204" pitchFamily="34" charset="0"/>
+              </a:rPr>
+              <a:t>the</a:t>
+            </a:r>
+            <a:r>
+              <a:rPr lang="de-DE" dirty="0">
+                <a:solidFill>
+                  <a:srgbClr val="267326"/>
+                </a:solidFill>
+                <a:latin typeface="Arial" panose="020B0604020202020204" pitchFamily="34" charset="0"/>
+                <a:cs typeface="Arial" panose="020B0604020202020204" pitchFamily="34" charset="0"/>
+              </a:rPr>
+              <a:t> </a:t>
+            </a:r>
+            <a:r>
+              <a:rPr lang="de-DE" b="1" dirty="0" err="1">
+                <a:solidFill>
+                  <a:srgbClr val="267326"/>
+                </a:solidFill>
+                <a:highlight>
+                  <a:srgbClr val="8CD000"/>
+                </a:highlight>
+                <a:latin typeface="Arial" panose="020B0604020202020204" pitchFamily="34" charset="0"/>
+                <a:cs typeface="Arial" panose="020B0604020202020204" pitchFamily="34" charset="0"/>
+              </a:rPr>
+              <a:t>expected</a:t>
+            </a:r>
+            <a:r>
+              <a:rPr lang="de-DE" b="1" dirty="0">
+                <a:solidFill>
+                  <a:srgbClr val="267326"/>
+                </a:solidFill>
+                <a:highlight>
+                  <a:srgbClr val="8CD000"/>
+                </a:highlight>
+                <a:latin typeface="Arial" panose="020B0604020202020204" pitchFamily="34" charset="0"/>
+                <a:cs typeface="Arial" panose="020B0604020202020204" pitchFamily="34" charset="0"/>
+              </a:rPr>
+              <a:t> </a:t>
+            </a:r>
+            <a:r>
+              <a:rPr lang="de-DE" b="1" dirty="0" err="1">
+                <a:solidFill>
+                  <a:srgbClr val="267326"/>
+                </a:solidFill>
+                <a:highlight>
+                  <a:srgbClr val="8CD000"/>
+                </a:highlight>
+                <a:latin typeface="Arial" panose="020B0604020202020204" pitchFamily="34" charset="0"/>
+                <a:cs typeface="Arial" panose="020B0604020202020204" pitchFamily="34" charset="0"/>
+              </a:rPr>
+              <a:t>percentile</a:t>
+            </a:r>
+            <a:r>
+              <a:rPr lang="de-DE" b="1" dirty="0">
+                <a:solidFill>
+                  <a:srgbClr val="267326"/>
+                </a:solidFill>
+                <a:highlight>
+                  <a:srgbClr val="8CD000"/>
+                </a:highlight>
+                <a:latin typeface="Arial" panose="020B0604020202020204" pitchFamily="34" charset="0"/>
+                <a:cs typeface="Arial" panose="020B0604020202020204" pitchFamily="34" charset="0"/>
+              </a:rPr>
+              <a:t> rank </a:t>
+            </a:r>
+            <a:r>
+              <a:rPr lang="de-DE" b="1" dirty="0" err="1">
+                <a:solidFill>
+                  <a:srgbClr val="267326"/>
+                </a:solidFill>
+                <a:highlight>
+                  <a:srgbClr val="8CD000"/>
+                </a:highlight>
+                <a:latin typeface="Arial" panose="020B0604020202020204" pitchFamily="34" charset="0"/>
+                <a:cs typeface="Arial" panose="020B0604020202020204" pitchFamily="34" charset="0"/>
+              </a:rPr>
+              <a:t>of</a:t>
+            </a:r>
+            <a:r>
+              <a:rPr lang="de-DE" b="1" dirty="0">
+                <a:solidFill>
+                  <a:srgbClr val="267326"/>
+                </a:solidFill>
+                <a:highlight>
+                  <a:srgbClr val="8CD000"/>
+                </a:highlight>
+                <a:latin typeface="Arial" panose="020B0604020202020204" pitchFamily="34" charset="0"/>
+                <a:cs typeface="Arial" panose="020B0604020202020204" pitchFamily="34" charset="0"/>
+              </a:rPr>
+              <a:t> </a:t>
+            </a:r>
+            <a:r>
+              <a:rPr lang="de-DE" b="1" dirty="0" err="1">
+                <a:solidFill>
+                  <a:srgbClr val="267326"/>
+                </a:solidFill>
+                <a:highlight>
+                  <a:srgbClr val="8CD000"/>
+                </a:highlight>
+                <a:latin typeface="Arial" panose="020B0604020202020204" pitchFamily="34" charset="0"/>
+                <a:cs typeface="Arial" panose="020B0604020202020204" pitchFamily="34" charset="0"/>
+              </a:rPr>
+              <a:t>the</a:t>
+            </a:r>
+            <a:r>
+              <a:rPr lang="de-DE" b="1" dirty="0">
+                <a:solidFill>
+                  <a:srgbClr val="267326"/>
+                </a:solidFill>
+                <a:highlight>
+                  <a:srgbClr val="8CD000"/>
+                </a:highlight>
+                <a:latin typeface="Arial" panose="020B0604020202020204" pitchFamily="34" charset="0"/>
+                <a:cs typeface="Arial" panose="020B0604020202020204" pitchFamily="34" charset="0"/>
+              </a:rPr>
+              <a:t> </a:t>
+            </a:r>
+            <a:r>
+              <a:rPr lang="de-DE" b="1" dirty="0" err="1">
+                <a:solidFill>
+                  <a:srgbClr val="267326"/>
+                </a:solidFill>
+                <a:highlight>
+                  <a:srgbClr val="8CD000"/>
+                </a:highlight>
+                <a:latin typeface="Arial" panose="020B0604020202020204" pitchFamily="34" charset="0"/>
+                <a:cs typeface="Arial" panose="020B0604020202020204" pitchFamily="34" charset="0"/>
+              </a:rPr>
+              <a:t>average</a:t>
+            </a:r>
+            <a:r>
+              <a:rPr lang="de-DE" b="1" dirty="0">
+                <a:solidFill>
+                  <a:srgbClr val="267326"/>
+                </a:solidFill>
+                <a:highlight>
+                  <a:srgbClr val="8CD000"/>
+                </a:highlight>
+                <a:latin typeface="Arial" panose="020B0604020202020204" pitchFamily="34" charset="0"/>
+                <a:cs typeface="Arial" panose="020B0604020202020204" pitchFamily="34" charset="0"/>
+              </a:rPr>
+              <a:t> </a:t>
+            </a:r>
+            <a:r>
+              <a:rPr lang="de-DE" b="1" dirty="0" err="1">
+                <a:solidFill>
+                  <a:srgbClr val="267326"/>
+                </a:solidFill>
+                <a:highlight>
+                  <a:srgbClr val="8CD000"/>
+                </a:highlight>
+                <a:latin typeface="Arial" panose="020B0604020202020204" pitchFamily="34" charset="0"/>
+                <a:cs typeface="Arial" panose="020B0604020202020204" pitchFamily="34" charset="0"/>
+              </a:rPr>
+              <a:t>comparison</a:t>
+            </a:r>
+            <a:r>
+              <a:rPr lang="de-DE" b="1" dirty="0">
+                <a:solidFill>
+                  <a:srgbClr val="267326"/>
+                </a:solidFill>
+                <a:highlight>
+                  <a:srgbClr val="8CD000"/>
+                </a:highlight>
+                <a:latin typeface="Arial" panose="020B0604020202020204" pitchFamily="34" charset="0"/>
+                <a:cs typeface="Arial" panose="020B0604020202020204" pitchFamily="34" charset="0"/>
+              </a:rPr>
+              <a:t> </a:t>
+            </a:r>
+            <a:r>
+              <a:rPr lang="de-DE" b="1" dirty="0" err="1">
+                <a:solidFill>
+                  <a:srgbClr val="267326"/>
+                </a:solidFill>
+                <a:highlight>
+                  <a:srgbClr val="8CD000"/>
+                </a:highlight>
+                <a:latin typeface="Arial" panose="020B0604020202020204" pitchFamily="34" charset="0"/>
+                <a:cs typeface="Arial" panose="020B0604020202020204" pitchFamily="34" charset="0"/>
+              </a:rPr>
+              <a:t>group</a:t>
+            </a:r>
+            <a:r>
+              <a:rPr lang="de-DE" b="1" dirty="0">
+                <a:solidFill>
+                  <a:srgbClr val="267326"/>
+                </a:solidFill>
+                <a:highlight>
+                  <a:srgbClr val="8CD000"/>
+                </a:highlight>
+                <a:latin typeface="Arial" panose="020B0604020202020204" pitchFamily="34" charset="0"/>
+                <a:cs typeface="Arial" panose="020B0604020202020204" pitchFamily="34" charset="0"/>
+              </a:rPr>
+              <a:t> </a:t>
+            </a:r>
+            <a:r>
+              <a:rPr lang="de-DE" b="1" dirty="0" err="1">
+                <a:solidFill>
+                  <a:srgbClr val="267326"/>
+                </a:solidFill>
+                <a:highlight>
+                  <a:srgbClr val="8CD000"/>
+                </a:highlight>
+                <a:latin typeface="Arial" panose="020B0604020202020204" pitchFamily="34" charset="0"/>
+                <a:cs typeface="Arial" panose="020B0604020202020204" pitchFamily="34" charset="0"/>
+              </a:rPr>
+              <a:t>student</a:t>
+            </a:r>
+            <a:r>
+              <a:rPr lang="de-DE" b="1" dirty="0">
+                <a:solidFill>
+                  <a:srgbClr val="267326"/>
+                </a:solidFill>
+                <a:highlight>
+                  <a:srgbClr val="8CD000"/>
+                </a:highlight>
+                <a:latin typeface="Arial" panose="020B0604020202020204" pitchFamily="34" charset="0"/>
+                <a:cs typeface="Arial" panose="020B0604020202020204" pitchFamily="34" charset="0"/>
+              </a:rPr>
+              <a:t> </a:t>
+            </a:r>
+            <a:r>
+              <a:rPr lang="de-DE" b="1" dirty="0" err="1">
+                <a:solidFill>
+                  <a:srgbClr val="267326"/>
+                </a:solidFill>
+                <a:highlight>
+                  <a:srgbClr val="8CD000"/>
+                </a:highlight>
+                <a:latin typeface="Arial" panose="020B0604020202020204" pitchFamily="34" charset="0"/>
+                <a:cs typeface="Arial" panose="020B0604020202020204" pitchFamily="34" charset="0"/>
+              </a:rPr>
+              <a:t>would</a:t>
+            </a:r>
+            <a:r>
+              <a:rPr lang="de-DE" b="1" dirty="0">
+                <a:solidFill>
+                  <a:srgbClr val="267326"/>
+                </a:solidFill>
+                <a:highlight>
+                  <a:srgbClr val="8CD000"/>
+                </a:highlight>
+                <a:latin typeface="Arial" panose="020B0604020202020204" pitchFamily="34" charset="0"/>
+                <a:cs typeface="Arial" panose="020B0604020202020204" pitchFamily="34" charset="0"/>
+              </a:rPr>
+              <a:t> </a:t>
+            </a:r>
+            <a:r>
+              <a:rPr lang="de-DE" b="1" dirty="0" err="1">
+                <a:solidFill>
+                  <a:srgbClr val="267326"/>
+                </a:solidFill>
+                <a:highlight>
+                  <a:srgbClr val="8CD000"/>
+                </a:highlight>
+                <a:latin typeface="Arial" panose="020B0604020202020204" pitchFamily="34" charset="0"/>
+                <a:cs typeface="Arial" panose="020B0604020202020204" pitchFamily="34" charset="0"/>
+              </a:rPr>
+              <a:t>increase</a:t>
+            </a:r>
+            <a:r>
+              <a:rPr lang="de-DE" b="1" dirty="0">
+                <a:solidFill>
+                  <a:srgbClr val="267326"/>
+                </a:solidFill>
+                <a:highlight>
+                  <a:srgbClr val="8CD000"/>
+                </a:highlight>
+                <a:latin typeface="Arial" panose="020B0604020202020204" pitchFamily="34" charset="0"/>
+                <a:cs typeface="Arial" panose="020B0604020202020204" pitchFamily="34" charset="0"/>
+              </a:rPr>
+              <a:t> </a:t>
+            </a:r>
+            <a:r>
+              <a:rPr lang="de-DE" b="1" dirty="0" err="1">
+                <a:solidFill>
+                  <a:srgbClr val="267326"/>
+                </a:solidFill>
+                <a:highlight>
+                  <a:srgbClr val="8CD000"/>
+                </a:highlight>
+                <a:latin typeface="Arial" panose="020B0604020202020204" pitchFamily="34" charset="0"/>
+                <a:cs typeface="Arial" panose="020B0604020202020204" pitchFamily="34" charset="0"/>
+              </a:rPr>
+              <a:t>by</a:t>
+            </a:r>
+            <a:r>
+              <a:rPr lang="de-DE" b="1" dirty="0">
+                <a:solidFill>
+                  <a:srgbClr val="267326"/>
+                </a:solidFill>
+                <a:highlight>
+                  <a:srgbClr val="8CD000"/>
+                </a:highlight>
+                <a:latin typeface="Arial" panose="020B0604020202020204" pitchFamily="34" charset="0"/>
+                <a:cs typeface="Arial" panose="020B0604020202020204" pitchFamily="34" charset="0"/>
+              </a:rPr>
+              <a:t> 13 </a:t>
+            </a:r>
+            <a:r>
+              <a:rPr lang="de-DE" b="1" dirty="0" err="1">
+                <a:solidFill>
+                  <a:srgbClr val="267326"/>
+                </a:solidFill>
+                <a:highlight>
+                  <a:srgbClr val="8CD000"/>
+                </a:highlight>
+                <a:latin typeface="Arial" panose="020B0604020202020204" pitchFamily="34" charset="0"/>
+                <a:cs typeface="Arial" panose="020B0604020202020204" pitchFamily="34" charset="0"/>
+              </a:rPr>
+              <a:t>points</a:t>
+            </a:r>
+            <a:r>
+              <a:rPr lang="de-DE" b="1" dirty="0">
+                <a:solidFill>
+                  <a:srgbClr val="267326"/>
+                </a:solidFill>
+                <a:highlight>
+                  <a:srgbClr val="8CD000"/>
+                </a:highlight>
+                <a:latin typeface="Arial" panose="020B0604020202020204" pitchFamily="34" charset="0"/>
+                <a:cs typeface="Arial" panose="020B0604020202020204" pitchFamily="34" charset="0"/>
+              </a:rPr>
+              <a:t> </a:t>
+            </a:r>
+            <a:r>
+              <a:rPr lang="de-DE" b="1" dirty="0" err="1">
+                <a:solidFill>
+                  <a:srgbClr val="267326"/>
+                </a:solidFill>
+                <a:highlight>
+                  <a:srgbClr val="8CD000"/>
+                </a:highlight>
+                <a:latin typeface="Arial" panose="020B0604020202020204" pitchFamily="34" charset="0"/>
+                <a:cs typeface="Arial" panose="020B0604020202020204" pitchFamily="34" charset="0"/>
+              </a:rPr>
+              <a:t>if</a:t>
+            </a:r>
+            <a:r>
+              <a:rPr lang="de-DE" b="1" dirty="0">
+                <a:solidFill>
+                  <a:srgbClr val="267326"/>
+                </a:solidFill>
+                <a:highlight>
+                  <a:srgbClr val="8CD000"/>
+                </a:highlight>
+                <a:latin typeface="Arial" panose="020B0604020202020204" pitchFamily="34" charset="0"/>
+                <a:cs typeface="Arial" panose="020B0604020202020204" pitchFamily="34" charset="0"/>
+              </a:rPr>
+              <a:t> </a:t>
+            </a:r>
+            <a:r>
+              <a:rPr lang="de-DE" b="1" dirty="0" err="1">
+                <a:solidFill>
+                  <a:srgbClr val="267326"/>
+                </a:solidFill>
+                <a:highlight>
+                  <a:srgbClr val="8CD000"/>
+                </a:highlight>
+                <a:latin typeface="Arial" panose="020B0604020202020204" pitchFamily="34" charset="0"/>
+                <a:cs typeface="Arial" panose="020B0604020202020204" pitchFamily="34" charset="0"/>
+              </a:rPr>
+              <a:t>the</a:t>
+            </a:r>
+            <a:r>
+              <a:rPr lang="de-DE" b="1" dirty="0">
+                <a:solidFill>
+                  <a:srgbClr val="267326"/>
+                </a:solidFill>
+                <a:highlight>
+                  <a:srgbClr val="8CD000"/>
+                </a:highlight>
+                <a:latin typeface="Arial" panose="020B0604020202020204" pitchFamily="34" charset="0"/>
+                <a:cs typeface="Arial" panose="020B0604020202020204" pitchFamily="34" charset="0"/>
+              </a:rPr>
+              <a:t> </a:t>
+            </a:r>
+            <a:r>
+              <a:rPr lang="de-DE" b="1" dirty="0" err="1">
+                <a:solidFill>
+                  <a:srgbClr val="267326"/>
+                </a:solidFill>
+                <a:highlight>
+                  <a:srgbClr val="8CD000"/>
+                </a:highlight>
+                <a:latin typeface="Arial" panose="020B0604020202020204" pitchFamily="34" charset="0"/>
+                <a:cs typeface="Arial" panose="020B0604020202020204" pitchFamily="34" charset="0"/>
+              </a:rPr>
+              <a:t>student</a:t>
+            </a:r>
+            <a:r>
+              <a:rPr lang="de-DE" b="1" dirty="0">
+                <a:solidFill>
+                  <a:srgbClr val="267326"/>
+                </a:solidFill>
+                <a:highlight>
+                  <a:srgbClr val="8CD000"/>
+                </a:highlight>
+                <a:latin typeface="Arial" panose="020B0604020202020204" pitchFamily="34" charset="0"/>
+                <a:cs typeface="Arial" panose="020B0604020202020204" pitchFamily="34" charset="0"/>
+              </a:rPr>
+              <a:t> </a:t>
+            </a:r>
+            <a:r>
+              <a:rPr lang="de-DE" b="1" dirty="0" err="1">
+                <a:solidFill>
+                  <a:srgbClr val="267326"/>
+                </a:solidFill>
+                <a:highlight>
+                  <a:srgbClr val="8CD000"/>
+                </a:highlight>
+                <a:latin typeface="Arial" panose="020B0604020202020204" pitchFamily="34" charset="0"/>
+                <a:cs typeface="Arial" panose="020B0604020202020204" pitchFamily="34" charset="0"/>
+              </a:rPr>
+              <a:t>received</a:t>
+            </a:r>
+            <a:r>
+              <a:rPr lang="de-DE" b="1" dirty="0">
+                <a:solidFill>
+                  <a:srgbClr val="267326"/>
+                </a:solidFill>
+                <a:highlight>
+                  <a:srgbClr val="8CD000"/>
+                </a:highlight>
+                <a:latin typeface="Arial" panose="020B0604020202020204" pitchFamily="34" charset="0"/>
+                <a:cs typeface="Arial" panose="020B0604020202020204" pitchFamily="34" charset="0"/>
+              </a:rPr>
+              <a:t> a Growth Mindset </a:t>
+            </a:r>
+            <a:r>
+              <a:rPr lang="de-DE" b="1" dirty="0" err="1">
+                <a:solidFill>
+                  <a:srgbClr val="267326"/>
+                </a:solidFill>
+                <a:highlight>
+                  <a:srgbClr val="8CD000"/>
+                </a:highlight>
+                <a:latin typeface="Arial" panose="020B0604020202020204" pitchFamily="34" charset="0"/>
+                <a:cs typeface="Arial" panose="020B0604020202020204" pitchFamily="34" charset="0"/>
+              </a:rPr>
+              <a:t>intervention</a:t>
+            </a:r>
+            <a:r>
+              <a:rPr lang="de-DE" dirty="0">
+                <a:solidFill>
+                  <a:srgbClr val="267326"/>
+                </a:solidFill>
+                <a:latin typeface="Arial" panose="020B0604020202020204" pitchFamily="34" charset="0"/>
+                <a:cs typeface="Arial" panose="020B0604020202020204" pitchFamily="34" charset="0"/>
+              </a:rPr>
+              <a:t>“ </a:t>
+            </a:r>
+          </a:p>
+          <a:p>
+            <a:endParaRPr lang="de-DE" dirty="0">
+              <a:solidFill>
+                <a:srgbClr val="267326"/>
+              </a:solidFill>
+              <a:latin typeface="Arial" panose="020B0604020202020204" pitchFamily="34" charset="0"/>
+              <a:cs typeface="Arial" panose="020B0604020202020204" pitchFamily="34" charset="0"/>
+            </a:endParaRPr>
+          </a:p>
+          <a:p>
+            <a:r>
+              <a:rPr lang="de-DE" dirty="0">
+                <a:solidFill>
+                  <a:srgbClr val="267326"/>
+                </a:solidFill>
+                <a:latin typeface="Arial" panose="020B0604020202020204" pitchFamily="34" charset="0"/>
+                <a:cs typeface="Arial" panose="020B0604020202020204" pitchFamily="34" charset="0"/>
+              </a:rPr>
+              <a:t>(</a:t>
+            </a:r>
+            <a:r>
+              <a:rPr lang="de-DE" dirty="0" err="1">
+                <a:solidFill>
+                  <a:srgbClr val="267326"/>
+                </a:solidFill>
+                <a:latin typeface="Arial" panose="020B0604020202020204" pitchFamily="34" charset="0"/>
+                <a:cs typeface="Arial" panose="020B0604020202020204" pitchFamily="34" charset="0"/>
+              </a:rPr>
+              <a:t>What</a:t>
+            </a:r>
+            <a:r>
+              <a:rPr lang="de-DE" dirty="0">
+                <a:solidFill>
+                  <a:srgbClr val="267326"/>
+                </a:solidFill>
+                <a:latin typeface="Arial" panose="020B0604020202020204" pitchFamily="34" charset="0"/>
+                <a:cs typeface="Arial" panose="020B0604020202020204" pitchFamily="34" charset="0"/>
+              </a:rPr>
+              <a:t> Works Clearinghouse, 2022, S.1)</a:t>
+            </a:r>
+          </a:p>
+        </p:txBody>
+      </p:sp>
+    </p:spTree>
+    <p:extLst>
+      <p:ext uri="{BB962C8B-B14F-4D97-AF65-F5344CB8AC3E}">
+        <p14:creationId xmlns:p14="http://schemas.microsoft.com/office/powerpoint/2010/main" val="775881505"/>
+      </p:ext>
+    </p:extLst>
+  </p:cSld>
+  <p:clrMapOvr>
+    <a:masterClrMapping/>
+  </p:clrMapOvr>
+</p:sld>
+</file>
+
+<file path=ppt/slides/slide6.xml><?xml version="1.0" encoding="utf-8"?>
+<p:sld xmlns:a="http://schemas.openxmlformats.org/drawingml/2006/main" xmlns:r="http://schemas.openxmlformats.org/officeDocument/2006/relationships" xmlns:p="http://schemas.openxmlformats.org/presentationml/2006/main">
+  <p:cSld>
+    <p:spTree>
+      <p:nvGrpSpPr>
+        <p:cNvPr id="1" name=""/>
+        <p:cNvGrpSpPr/>
+        <p:nvPr/>
+      </p:nvGrpSpPr>
+      <p:grpSpPr>
+        <a:xfrm>
+          <a:off x="0" y="0"/>
+          <a:ext cx="0" cy="0"/>
+          <a:chOff x="0" y="0"/>
+          <a:chExt cx="0" cy="0"/>
+        </a:xfrm>
+      </p:grpSpPr>
+      <p:pic>
+        <p:nvPicPr>
+          <p:cNvPr id="4" name="Inhaltsplatzhalter 3" descr="Ein Bild, das Text, Screenshot, Schrift, Design enthält.&#10;&#10;Automatisch generierte Beschreibung">
+            <a:extLst>
+              <a:ext uri="{FF2B5EF4-FFF2-40B4-BE49-F238E27FC236}">
+                <a16:creationId xmlns:a16="http://schemas.microsoft.com/office/drawing/2014/main" id="{2F7B2D87-C7A5-46B5-811D-5788267DA78E}"/>
+              </a:ext>
+            </a:extLst>
+          </p:cNvPr>
+          <p:cNvPicPr>
+            <a:picLocks noGrp="1" noChangeAspect="1"/>
+          </p:cNvPicPr>
+          <p:nvPr>
+            <p:ph idx="1"/>
+          </p:nvPr>
+        </p:nvPicPr>
+        <p:blipFill>
+          <a:blip r:embed="rId2"/>
+          <a:stretch>
+            <a:fillRect/>
+          </a:stretch>
+        </p:blipFill>
+        <p:spPr>
+          <a:xfrm>
+            <a:off x="260746" y="864278"/>
+            <a:ext cx="6677819" cy="1871893"/>
+          </a:xfrm>
+          <a:prstGeom prst="rect">
+            <a:avLst/>
+          </a:prstGeom>
+        </p:spPr>
+      </p:pic>
+      <p:sp>
+        <p:nvSpPr>
+          <p:cNvPr id="5" name="Textfeld 4">
+            <a:extLst>
+              <a:ext uri="{FF2B5EF4-FFF2-40B4-BE49-F238E27FC236}">
+                <a16:creationId xmlns:a16="http://schemas.microsoft.com/office/drawing/2014/main" id="{14CD5BB5-763B-1E3F-EAB0-70795069833F}"/>
+              </a:ext>
+            </a:extLst>
+          </p:cNvPr>
+          <p:cNvSpPr txBox="1"/>
+          <p:nvPr/>
+        </p:nvSpPr>
+        <p:spPr>
+          <a:xfrm>
+            <a:off x="2353906" y="2729142"/>
+            <a:ext cx="2491498" cy="369332"/>
+          </a:xfrm>
+          <a:prstGeom prst="rect">
+            <a:avLst/>
+          </a:prstGeom>
+          <a:noFill/>
+        </p:spPr>
+        <p:txBody>
+          <a:bodyPr wrap="square" rtlCol="0">
+            <a:spAutoFit/>
+          </a:bodyPr>
+          <a:lstStyle/>
+          <a:p>
+            <a:r>
+              <a:rPr lang="de-DE" dirty="0">
+                <a:solidFill>
+                  <a:srgbClr val="8CD000"/>
+                </a:solidFill>
+                <a:latin typeface="Arial" panose="020B0604020202020204" pitchFamily="34" charset="0"/>
+                <a:cs typeface="Arial" panose="020B0604020202020204" pitchFamily="34" charset="0"/>
+              </a:rPr>
+              <a:t>Backfisch et al. (2021)</a:t>
+            </a:r>
+          </a:p>
+        </p:txBody>
+      </p:sp>
+    </p:spTree>
+    <p:extLst>
+      <p:ext uri="{BB962C8B-B14F-4D97-AF65-F5344CB8AC3E}">
+        <p14:creationId xmlns:p14="http://schemas.microsoft.com/office/powerpoint/2010/main" val="3070647414"/>
+      </p:ext>
+    </p:extLst>
+  </p:cSld>
+  <p:clrMapOvr>
+    <a:masterClrMapping/>
+  </p:clrMapOvr>
+</p:sld>
+</file>
+
+<file path=ppt/slides/slide7.xml><?xml version="1.0" encoding="utf-8"?>
+<p:sld xmlns:a="http://schemas.openxmlformats.org/drawingml/2006/main" xmlns:r="http://schemas.openxmlformats.org/officeDocument/2006/relationships" xmlns:p="http://schemas.openxmlformats.org/presentationml/2006/main">
+  <p:cSld>
+    <p:spTree>
+      <p:nvGrpSpPr>
+        <p:cNvPr id="1" name=""/>
+        <p:cNvGrpSpPr/>
+        <p:nvPr/>
+      </p:nvGrpSpPr>
+      <p:grpSpPr>
+        <a:xfrm>
+          <a:off x="0" y="0"/>
+          <a:ext cx="0" cy="0"/>
+          <a:chOff x="0" y="0"/>
+          <a:chExt cx="0" cy="0"/>
+        </a:xfrm>
+      </p:grpSpPr>
+      <p:pic>
+        <p:nvPicPr>
+          <p:cNvPr id="6" name="Grafik 5" descr="Ein Bild, das Text, Screenshot, Schrift, Reihe enthält.&#10;&#10;Automatisch generierte Beschreibung">
+            <a:extLst>
+              <a:ext uri="{FF2B5EF4-FFF2-40B4-BE49-F238E27FC236}">
+                <a16:creationId xmlns:a16="http://schemas.microsoft.com/office/drawing/2014/main" id="{417D761B-841E-BDAC-3FCA-BF58FC711472}"/>
+              </a:ext>
+            </a:extLst>
+          </p:cNvPr>
+          <p:cNvPicPr>
+            <a:picLocks noChangeAspect="1"/>
+          </p:cNvPicPr>
+          <p:nvPr/>
+        </p:nvPicPr>
+        <p:blipFill>
+          <a:blip r:embed="rId2"/>
+          <a:stretch>
+            <a:fillRect/>
+          </a:stretch>
+        </p:blipFill>
+        <p:spPr>
+          <a:xfrm>
+            <a:off x="2927533" y="850719"/>
+            <a:ext cx="1344244" cy="1899012"/>
+          </a:xfrm>
+          <a:prstGeom prst="rect">
+            <a:avLst/>
+          </a:prstGeom>
+        </p:spPr>
+      </p:pic>
+      <p:sp>
+        <p:nvSpPr>
+          <p:cNvPr id="8" name="Textfeld 7">
+            <a:extLst>
+              <a:ext uri="{FF2B5EF4-FFF2-40B4-BE49-F238E27FC236}">
+                <a16:creationId xmlns:a16="http://schemas.microsoft.com/office/drawing/2014/main" id="{C2F67B03-E5B2-7508-33E5-C8555C57F614}"/>
+              </a:ext>
+            </a:extLst>
+          </p:cNvPr>
+          <p:cNvSpPr txBox="1"/>
+          <p:nvPr/>
+        </p:nvSpPr>
+        <p:spPr>
+          <a:xfrm>
+            <a:off x="1791636" y="2749731"/>
+            <a:ext cx="3616037" cy="369332"/>
+          </a:xfrm>
+          <a:prstGeom prst="rect">
+            <a:avLst/>
+          </a:prstGeom>
+          <a:noFill/>
+        </p:spPr>
+        <p:txBody>
+          <a:bodyPr wrap="square">
+            <a:spAutoFit/>
+          </a:bodyPr>
+          <a:lstStyle/>
+          <a:p>
+            <a:r>
+              <a:rPr lang="de-DE" dirty="0" err="1">
+                <a:solidFill>
+                  <a:srgbClr val="8CD000"/>
+                </a:solidFill>
+                <a:latin typeface="Arial" panose="020B0604020202020204" pitchFamily="34" charset="0"/>
+              </a:rPr>
+              <a:t>What</a:t>
+            </a:r>
+            <a:r>
+              <a:rPr lang="de-DE" dirty="0">
+                <a:solidFill>
+                  <a:srgbClr val="8CD000"/>
+                </a:solidFill>
+                <a:latin typeface="Arial" panose="020B0604020202020204" pitchFamily="34" charset="0"/>
+              </a:rPr>
+              <a:t> Works Clearinghouse, 2021</a:t>
+            </a:r>
+            <a:endParaRPr lang="de-DE" dirty="0"/>
+          </a:p>
+        </p:txBody>
+      </p:sp>
+    </p:spTree>
+    <p:extLst>
+      <p:ext uri="{BB962C8B-B14F-4D97-AF65-F5344CB8AC3E}">
+        <p14:creationId xmlns:p14="http://schemas.microsoft.com/office/powerpoint/2010/main" val="4037360074"/>
       </p:ext>
     </p:extLst>
   </p:cSld>

</xml_diff>